<commit_message>
user manual update, presentation update, sql update
</commit_message>
<xml_diff>
--- a/Presentation Slides/Presentation 3.pptx
+++ b/Presentation Slides/Presentation 3.pptx
@@ -6,12 +6,12 @@
   </p:sldMasterIdLst>
   <p:sldIdLst>
     <p:sldId id="256" r:id="rId2"/>
-    <p:sldId id="257" r:id="rId3"/>
-    <p:sldId id="258" r:id="rId4"/>
-    <p:sldId id="259" r:id="rId5"/>
-    <p:sldId id="260" r:id="rId6"/>
-    <p:sldId id="261" r:id="rId7"/>
-    <p:sldId id="262" r:id="rId8"/>
+    <p:sldId id="273" r:id="rId3"/>
+    <p:sldId id="257" r:id="rId4"/>
+    <p:sldId id="258" r:id="rId5"/>
+    <p:sldId id="262" r:id="rId6"/>
+    <p:sldId id="271" r:id="rId7"/>
+    <p:sldId id="272" r:id="rId8"/>
     <p:sldId id="265" r:id="rId9"/>
     <p:sldId id="266" r:id="rId10"/>
     <p:sldId id="267" r:id="rId11"/>
@@ -3751,6 +3751,97 @@
             <p:ph type="title"/>
           </p:nvPr>
         </p:nvSpPr>
+        <p:spPr/>
+        <p:txBody>
+          <a:bodyPr/>
+          <a:lstStyle/>
+          <a:p>
+            <a:r>
+              <a:rPr lang="en-US" dirty="0" smtClean="0"/>
+              <a:t>Presentation</a:t>
+            </a:r>
+            <a:endParaRPr lang="en-US" dirty="0"/>
+          </a:p>
+        </p:txBody>
+      </p:sp>
+      <p:sp>
+        <p:nvSpPr>
+          <p:cNvPr id="3" name="Content Placeholder 2"/>
+          <p:cNvSpPr>
+            <a:spLocks noGrp="1"/>
+          </p:cNvSpPr>
+          <p:nvPr>
+            <p:ph idx="1"/>
+          </p:nvPr>
+        </p:nvSpPr>
+        <p:spPr/>
+        <p:txBody>
+          <a:bodyPr/>
+          <a:lstStyle/>
+          <a:p>
+            <a:pPr marL="0" indent="0">
+              <a:buNone/>
+            </a:pPr>
+            <a:endParaRPr lang="en-US" dirty="0" smtClean="0"/>
+          </a:p>
+          <a:p>
+            <a:pPr marL="0" indent="0">
+              <a:buNone/>
+            </a:pPr>
+            <a:endParaRPr lang="en-US" dirty="0"/>
+          </a:p>
+          <a:p>
+            <a:pPr marL="0" indent="0">
+              <a:buNone/>
+            </a:pPr>
+            <a:r>
+              <a:rPr lang="en-US" sz="6000" dirty="0" smtClean="0"/>
+              <a:t>What’s my project about?</a:t>
+            </a:r>
+            <a:endParaRPr lang="en-US" sz="6000" dirty="0"/>
+          </a:p>
+        </p:txBody>
+      </p:sp>
+    </p:spTree>
+    <p:extLst>
+      <p:ext uri="{BB962C8B-B14F-4D97-AF65-F5344CB8AC3E}">
+        <p14:creationId xmlns:p14="http://schemas.microsoft.com/office/powerpoint/2010/main" val="415674772"/>
+      </p:ext>
+    </p:extLst>
+  </p:cSld>
+  <p:clrMapOvr>
+    <a:masterClrMapping/>
+  </p:clrMapOvr>
+</p:sld>
+</file>
+
+<file path=ppt/slides/slide3.xml><?xml version="1.0" encoding="utf-8"?>
+<p:sld xmlns:a="http://schemas.openxmlformats.org/drawingml/2006/main" xmlns:r="http://schemas.openxmlformats.org/officeDocument/2006/relationships" xmlns:p="http://schemas.openxmlformats.org/presentationml/2006/main">
+  <p:cSld>
+    <p:spTree>
+      <p:nvGrpSpPr>
+        <p:cNvPr id="1" name=""/>
+        <p:cNvGrpSpPr/>
+        <p:nvPr/>
+      </p:nvGrpSpPr>
+      <p:grpSpPr>
+        <a:xfrm>
+          <a:off x="0" y="0"/>
+          <a:ext cx="0" cy="0"/>
+          <a:chOff x="0" y="0"/>
+          <a:chExt cx="0" cy="0"/>
+        </a:xfrm>
+      </p:grpSpPr>
+      <p:sp>
+        <p:nvSpPr>
+          <p:cNvPr id="2" name="Title 1"/>
+          <p:cNvSpPr>
+            <a:spLocks noGrp="1"/>
+          </p:cNvSpPr>
+          <p:nvPr>
+            <p:ph type="title"/>
+          </p:nvPr>
+        </p:nvSpPr>
         <p:spPr>
           <a:xfrm>
             <a:off x="457200" y="76200"/>
@@ -3763,11 +3854,7 @@
           <a:p>
             <a:r>
               <a:rPr lang="en-US" dirty="0" smtClean="0"/>
-              <a:t>Stories in spring </a:t>
-            </a:r>
-            <a:r>
-              <a:rPr lang="en-US" dirty="0" smtClean="0"/>
-              <a:t>2</a:t>
+              <a:t>Stories in spring 2</a:t>
             </a:r>
             <a:endParaRPr lang="en-US" dirty="0"/>
           </a:p>
@@ -3801,11 +3888,7 @@
             </a:r>
             <a:r>
               <a:rPr lang="en-US" dirty="0" smtClean="0"/>
-              <a:t> </a:t>
-            </a:r>
-            <a:r>
-              <a:rPr lang="en-US" dirty="0" smtClean="0"/>
-              <a:t>points</a:t>
+              <a:t> points</a:t>
             </a:r>
             <a:endParaRPr lang="en-US" dirty="0"/>
           </a:p>
@@ -3869,11 +3952,7 @@
             </a:r>
             <a:r>
               <a:rPr lang="en-US" dirty="0" smtClean="0"/>
-              <a:t> </a:t>
-            </a:r>
-            <a:r>
-              <a:rPr lang="en-US" dirty="0" smtClean="0"/>
-              <a:t>Points</a:t>
+              <a:t> Points</a:t>
             </a:r>
             <a:endParaRPr lang="en-US" dirty="0"/>
           </a:p>
@@ -3963,15 +4042,7 @@
           <a:p>
             <a:r>
               <a:rPr lang="en-US" dirty="0" smtClean="0"/>
-              <a:t>8</a:t>
-            </a:r>
-            <a:r>
-              <a:rPr lang="en-US" dirty="0" smtClean="0"/>
-              <a:t> </a:t>
-            </a:r>
-            <a:r>
-              <a:rPr lang="en-US" dirty="0" smtClean="0"/>
-              <a:t>points</a:t>
+              <a:t>8 points</a:t>
             </a:r>
             <a:endParaRPr lang="en-US" dirty="0"/>
           </a:p>
@@ -4001,11 +4072,7 @@
           <a:p>
             <a:r>
               <a:rPr lang="en-US" dirty="0" smtClean="0"/>
-              <a:t>16 </a:t>
-            </a:r>
-            <a:r>
-              <a:rPr lang="en-US" dirty="0" smtClean="0"/>
-              <a:t>points</a:t>
+              <a:t>16 points</a:t>
             </a:r>
             <a:endParaRPr lang="en-US" dirty="0"/>
           </a:p>
@@ -4035,11 +4102,7 @@
           <a:p>
             <a:r>
               <a:rPr lang="en-US" dirty="0" smtClean="0"/>
-              <a:t>0 </a:t>
-            </a:r>
-            <a:r>
-              <a:rPr lang="en-US" dirty="0" smtClean="0"/>
-              <a:t>points</a:t>
+              <a:t>0 points</a:t>
             </a:r>
             <a:endParaRPr lang="en-US" dirty="0"/>
           </a:p>
@@ -4101,24 +4164,12 @@
               <a:rPr lang="en-US" dirty="0" smtClean="0"/>
               <a:t>40</a:t>
             </a:r>
-            <a:r>
-              <a:rPr lang="en-US" dirty="0" smtClean="0"/>
-              <a:t/>
-            </a:r>
             <a:br>
               <a:rPr lang="en-US" dirty="0" smtClean="0"/>
             </a:br>
             <a:r>
               <a:rPr lang="en-US" dirty="0" smtClean="0"/>
-              <a:t>----  </a:t>
-            </a:r>
-            <a:r>
-              <a:rPr lang="en-US" dirty="0" smtClean="0"/>
-              <a:t>=   1</a:t>
-            </a:r>
-            <a:r>
-              <a:rPr lang="en-US" dirty="0" smtClean="0"/>
-              <a:t/>
+              <a:t>----  =   1</a:t>
             </a:r>
             <a:br>
               <a:rPr lang="en-US" dirty="0" smtClean="0"/>
@@ -4209,15 +4260,7 @@
           <a:p>
             <a:r>
               <a:rPr lang="en-US" dirty="0" smtClean="0"/>
-              <a:t>16</a:t>
-            </a:r>
-            <a:r>
-              <a:rPr lang="en-US" dirty="0" smtClean="0"/>
-              <a:t> </a:t>
-            </a:r>
-            <a:r>
-              <a:rPr lang="en-US" dirty="0" smtClean="0"/>
-              <a:t>Points</a:t>
+              <a:t>16 Points</a:t>
             </a:r>
             <a:endParaRPr lang="en-US" dirty="0"/>
           </a:p>
@@ -4247,11 +4290,7 @@
           <a:p>
             <a:r>
               <a:rPr lang="en-US" dirty="0" smtClean="0"/>
-              <a:t>16 </a:t>
-            </a:r>
-            <a:r>
-              <a:rPr lang="en-US" dirty="0" smtClean="0"/>
-              <a:t>points</a:t>
+              <a:t>16 points</a:t>
             </a:r>
             <a:endParaRPr lang="en-US" dirty="0"/>
           </a:p>
@@ -4311,11 +4350,7 @@
           <a:p>
             <a:r>
               <a:rPr lang="en-US" dirty="0" smtClean="0"/>
-              <a:t>0 </a:t>
-            </a:r>
-            <a:r>
-              <a:rPr lang="en-US" dirty="0" smtClean="0"/>
-              <a:t>points</a:t>
+              <a:t>0 points</a:t>
             </a:r>
             <a:endParaRPr lang="en-US" dirty="0"/>
           </a:p>
@@ -4325,251 +4360,6 @@
     <p:extLst>
       <p:ext uri="{BB962C8B-B14F-4D97-AF65-F5344CB8AC3E}">
         <p14:creationId xmlns:p14="http://schemas.microsoft.com/office/powerpoint/2010/main" val="488414602"/>
-      </p:ext>
-    </p:extLst>
-  </p:cSld>
-  <p:clrMapOvr>
-    <a:masterClrMapping/>
-  </p:clrMapOvr>
-  <p:timing>
-    <p:tnLst>
-      <p:par>
-        <p:cTn id="1" dur="indefinite" restart="never" nodeType="tmRoot"/>
-      </p:par>
-    </p:tnLst>
-  </p:timing>
-</p:sld>
-</file>
-
-<file path=ppt/slides/slide3.xml><?xml version="1.0" encoding="utf-8"?>
-<p:sld xmlns:a="http://schemas.openxmlformats.org/drawingml/2006/main" xmlns:r="http://schemas.openxmlformats.org/officeDocument/2006/relationships" xmlns:p="http://schemas.openxmlformats.org/presentationml/2006/main">
-  <p:cSld>
-    <p:spTree>
-      <p:nvGrpSpPr>
-        <p:cNvPr id="1" name=""/>
-        <p:cNvGrpSpPr/>
-        <p:nvPr/>
-      </p:nvGrpSpPr>
-      <p:grpSpPr>
-        <a:xfrm>
-          <a:off x="0" y="0"/>
-          <a:ext cx="0" cy="0"/>
-          <a:chOff x="0" y="0"/>
-          <a:chExt cx="0" cy="0"/>
-        </a:xfrm>
-      </p:grpSpPr>
-      <p:sp>
-        <p:nvSpPr>
-          <p:cNvPr id="2" name="Title 1"/>
-          <p:cNvSpPr>
-            <a:spLocks noGrp="1"/>
-          </p:cNvSpPr>
-          <p:nvPr>
-            <p:ph type="title"/>
-          </p:nvPr>
-        </p:nvSpPr>
-        <p:spPr/>
-        <p:txBody>
-          <a:bodyPr/>
-          <a:lstStyle/>
-          <a:p>
-            <a:r>
-              <a:rPr lang="en-US" dirty="0" smtClean="0"/>
-              <a:t>Mingle Daily Scrum</a:t>
-            </a:r>
-            <a:endParaRPr lang="en-US" dirty="0"/>
-          </a:p>
-        </p:txBody>
-      </p:sp>
-      <p:pic>
-        <p:nvPicPr>
-          <p:cNvPr id="2051" name="Picture 3"/>
-          <p:cNvPicPr>
-            <a:picLocks noChangeAspect="1" noChangeArrowheads="1"/>
-          </p:cNvPicPr>
-          <p:nvPr/>
-        </p:nvPicPr>
-        <p:blipFill>
-          <a:blip r:embed="rId2">
-            <a:extLst>
-              <a:ext uri="{28A0092B-C50C-407E-A947-70E740481C1C}">
-                <a14:useLocalDpi xmlns:a14="http://schemas.microsoft.com/office/drawing/2010/main" val="0"/>
-              </a:ext>
-            </a:extLst>
-          </a:blip>
-          <a:srcRect/>
-          <a:stretch>
-            <a:fillRect/>
-          </a:stretch>
-        </p:blipFill>
-        <p:spPr bwMode="auto">
-          <a:xfrm>
-            <a:off x="990600" y="1524000"/>
-            <a:ext cx="1981200" cy="4776381"/>
-          </a:xfrm>
-          <a:prstGeom prst="rect">
-            <a:avLst/>
-          </a:prstGeom>
-          <a:noFill/>
-          <a:ln>
-            <a:noFill/>
-          </a:ln>
-          <a:extLst>
-            <a:ext uri="{909E8E84-426E-40DD-AFC4-6F175D3DCCD1}">
-              <a14:hiddenFill xmlns:a14="http://schemas.microsoft.com/office/drawing/2010/main">
-                <a:solidFill>
-                  <a:schemeClr val="accent1"/>
-                </a:solidFill>
-              </a14:hiddenFill>
-            </a:ext>
-            <a:ext uri="{91240B29-F687-4F45-9708-019B960494DF}">
-              <a14:hiddenLine xmlns:a14="http://schemas.microsoft.com/office/drawing/2010/main" w="9525">
-                <a:solidFill>
-                  <a:schemeClr val="tx1"/>
-                </a:solidFill>
-                <a:miter lim="800000"/>
-                <a:headEnd/>
-                <a:tailEnd/>
-              </a14:hiddenLine>
-            </a:ext>
-          </a:extLst>
-        </p:spPr>
-      </p:pic>
-      <p:sp>
-        <p:nvSpPr>
-          <p:cNvPr id="4" name="TextBox 3"/>
-          <p:cNvSpPr txBox="1"/>
-          <p:nvPr/>
-        </p:nvSpPr>
-        <p:spPr>
-          <a:xfrm>
-            <a:off x="3352800" y="1524000"/>
-            <a:ext cx="2124621" cy="369332"/>
-          </a:xfrm>
-          <a:prstGeom prst="rect">
-            <a:avLst/>
-          </a:prstGeom>
-          <a:noFill/>
-        </p:spPr>
-        <p:txBody>
-          <a:bodyPr wrap="none" rtlCol="0">
-            <a:spAutoFit/>
-          </a:bodyPr>
-          <a:lstStyle/>
-          <a:p>
-            <a:r>
-              <a:rPr lang="en-US" dirty="0" smtClean="0"/>
-              <a:t>Sprint Planning: 4hrs</a:t>
-            </a:r>
-            <a:endParaRPr lang="en-US" dirty="0"/>
-          </a:p>
-        </p:txBody>
-      </p:sp>
-      <p:sp>
-        <p:nvSpPr>
-          <p:cNvPr id="5" name="TextBox 4"/>
-          <p:cNvSpPr txBox="1"/>
-          <p:nvPr/>
-        </p:nvSpPr>
-        <p:spPr>
-          <a:xfrm>
-            <a:off x="3532909" y="3727524"/>
-            <a:ext cx="1055930" cy="369332"/>
-          </a:xfrm>
-          <a:prstGeom prst="rect">
-            <a:avLst/>
-          </a:prstGeom>
-          <a:noFill/>
-        </p:spPr>
-        <p:txBody>
-          <a:bodyPr wrap="none" rtlCol="0">
-            <a:spAutoFit/>
-          </a:bodyPr>
-          <a:lstStyle/>
-          <a:p>
-            <a:r>
-              <a:rPr lang="en-US" dirty="0" smtClean="0"/>
-              <a:t>GUI: 4hrs</a:t>
-            </a:r>
-            <a:endParaRPr lang="en-US" dirty="0"/>
-          </a:p>
-        </p:txBody>
-      </p:sp>
-      <p:sp>
-        <p:nvSpPr>
-          <p:cNvPr id="6" name="TextBox 5"/>
-          <p:cNvSpPr txBox="1"/>
-          <p:nvPr/>
-        </p:nvSpPr>
-        <p:spPr>
-          <a:xfrm>
-            <a:off x="3657600" y="3244334"/>
-            <a:ext cx="4651466" cy="369332"/>
-          </a:xfrm>
-          <a:prstGeom prst="rect">
-            <a:avLst/>
-          </a:prstGeom>
-          <a:noFill/>
-        </p:spPr>
-        <p:txBody>
-          <a:bodyPr wrap="none" rtlCol="0">
-            <a:spAutoFit/>
-          </a:bodyPr>
-          <a:lstStyle/>
-          <a:p>
-            <a:r>
-              <a:rPr lang="en-US" dirty="0" smtClean="0"/>
-              <a:t>Mocked up = functional graphical user interface</a:t>
-            </a:r>
-            <a:endParaRPr lang="en-US" dirty="0"/>
-          </a:p>
-        </p:txBody>
-      </p:sp>
-      <p:sp>
-        <p:nvSpPr>
-          <p:cNvPr id="7" name="TextBox 6"/>
-          <p:cNvSpPr txBox="1"/>
-          <p:nvPr/>
-        </p:nvSpPr>
-        <p:spPr>
-          <a:xfrm>
-            <a:off x="3657600" y="5070762"/>
-            <a:ext cx="1578381" cy="646331"/>
-          </a:xfrm>
-          <a:prstGeom prst="rect">
-            <a:avLst/>
-          </a:prstGeom>
-          <a:noFill/>
-        </p:spPr>
-        <p:txBody>
-          <a:bodyPr wrap="none" rtlCol="0">
-            <a:spAutoFit/>
-          </a:bodyPr>
-          <a:lstStyle/>
-          <a:p>
-            <a:r>
-              <a:rPr lang="en-US" dirty="0" err="1" smtClean="0"/>
-              <a:t>Gui</a:t>
-            </a:r>
-            <a:r>
-              <a:rPr lang="en-US" dirty="0" smtClean="0"/>
-              <a:t>: 2hrs</a:t>
-            </a:r>
-            <a:br>
-              <a:rPr lang="en-US" dirty="0" smtClean="0"/>
-            </a:br>
-            <a:r>
-              <a:rPr lang="en-US" dirty="0" smtClean="0"/>
-              <a:t>Database: 3hrs</a:t>
-            </a:r>
-            <a:endParaRPr lang="en-US" dirty="0"/>
-          </a:p>
-        </p:txBody>
-      </p:sp>
-    </p:spTree>
-    <p:extLst>
-      <p:ext uri="{BB962C8B-B14F-4D97-AF65-F5344CB8AC3E}">
-        <p14:creationId xmlns:p14="http://schemas.microsoft.com/office/powerpoint/2010/main" val="1578470463"/>
       </p:ext>
     </p:extLst>
   </p:cSld>
@@ -4628,7 +4418,7 @@
       </p:sp>
       <p:pic>
         <p:nvPicPr>
-          <p:cNvPr id="3074" name="Picture 2"/>
+          <p:cNvPr id="1028" name="Picture 4"/>
           <p:cNvPicPr>
             <a:picLocks noChangeAspect="1" noChangeArrowheads="1"/>
           </p:cNvPicPr>
@@ -4649,8 +4439,8 @@
         </p:blipFill>
         <p:spPr bwMode="auto">
           <a:xfrm>
-            <a:off x="1219200" y="1752600"/>
-            <a:ext cx="2590800" cy="3780649"/>
+            <a:off x="685800" y="1296471"/>
+            <a:ext cx="1905000" cy="5300306"/>
           </a:xfrm>
           <a:prstGeom prst="rect">
             <a:avLst/>
@@ -4680,99 +4470,118 @@
           </a:extLst>
         </p:spPr>
       </p:pic>
-      <p:sp>
-        <p:nvSpPr>
-          <p:cNvPr id="4" name="TextBox 3"/>
-          <p:cNvSpPr txBox="1"/>
+      <p:pic>
+        <p:nvPicPr>
+          <p:cNvPr id="1029" name="Picture 5"/>
+          <p:cNvPicPr>
+            <a:picLocks noChangeAspect="1" noChangeArrowheads="1"/>
+          </p:cNvPicPr>
           <p:nvPr/>
-        </p:nvSpPr>
-        <p:spPr>
+        </p:nvPicPr>
+        <p:blipFill>
+          <a:blip r:embed="rId3">
+            <a:extLst>
+              <a:ext uri="{28A0092B-C50C-407E-A947-70E740481C1C}">
+                <a14:useLocalDpi xmlns:a14="http://schemas.microsoft.com/office/drawing/2010/main" val="0"/>
+              </a:ext>
+            </a:extLst>
+          </a:blip>
+          <a:srcRect/>
+          <a:stretch>
+            <a:fillRect/>
+          </a:stretch>
+        </p:blipFill>
+        <p:spPr bwMode="auto">
           <a:xfrm>
-            <a:off x="4343400" y="2133600"/>
-            <a:ext cx="1631280" cy="646331"/>
+            <a:off x="3581400" y="1296471"/>
+            <a:ext cx="1750002" cy="5054201"/>
           </a:xfrm>
           <a:prstGeom prst="rect">
             <a:avLst/>
           </a:prstGeom>
           <a:noFill/>
+          <a:ln>
+            <a:noFill/>
+          </a:ln>
+          <a:extLst>
+            <a:ext uri="{909E8E84-426E-40DD-AFC4-6F175D3DCCD1}">
+              <a14:hiddenFill xmlns:a14="http://schemas.microsoft.com/office/drawing/2010/main">
+                <a:solidFill>
+                  <a:schemeClr val="accent1"/>
+                </a:solidFill>
+              </a14:hiddenFill>
+            </a:ext>
+            <a:ext uri="{91240B29-F687-4F45-9708-019B960494DF}">
+              <a14:hiddenLine xmlns:a14="http://schemas.microsoft.com/office/drawing/2010/main" w="9525">
+                <a:solidFill>
+                  <a:schemeClr val="tx1"/>
+                </a:solidFill>
+                <a:miter lim="800000"/>
+                <a:headEnd/>
+                <a:tailEnd/>
+              </a14:hiddenLine>
+            </a:ext>
+          </a:extLst>
         </p:spPr>
-        <p:txBody>
-          <a:bodyPr wrap="none" rtlCol="0">
-            <a:spAutoFit/>
-          </a:bodyPr>
-          <a:lstStyle/>
-          <a:p>
-            <a:r>
-              <a:rPr lang="en-US" dirty="0" smtClean="0"/>
-              <a:t>GUI: 3hrs</a:t>
-            </a:r>
-            <a:br>
-              <a:rPr lang="en-US" dirty="0" smtClean="0"/>
-            </a:br>
-            <a:r>
-              <a:rPr lang="en-US" dirty="0" smtClean="0"/>
-              <a:t>Database: 2 </a:t>
-            </a:r>
-            <a:r>
-              <a:rPr lang="en-US" dirty="0" err="1" smtClean="0"/>
-              <a:t>hrs</a:t>
-            </a:r>
-            <a:endParaRPr lang="en-US" dirty="0"/>
-          </a:p>
-        </p:txBody>
-      </p:sp>
-      <p:sp>
-        <p:nvSpPr>
-          <p:cNvPr id="6" name="TextBox 5"/>
-          <p:cNvSpPr txBox="1"/>
+      </p:pic>
+      <p:pic>
+        <p:nvPicPr>
+          <p:cNvPr id="1030" name="Picture 6"/>
+          <p:cNvPicPr>
+            <a:picLocks noChangeAspect="1" noChangeArrowheads="1"/>
+          </p:cNvPicPr>
           <p:nvPr/>
-        </p:nvSpPr>
-        <p:spPr>
+        </p:nvPicPr>
+        <p:blipFill>
+          <a:blip r:embed="rId4">
+            <a:extLst>
+              <a:ext uri="{28A0092B-C50C-407E-A947-70E740481C1C}">
+                <a14:useLocalDpi xmlns:a14="http://schemas.microsoft.com/office/drawing/2010/main" val="0"/>
+              </a:ext>
+            </a:extLst>
+          </a:blip>
+          <a:srcRect/>
+          <a:stretch>
+            <a:fillRect/>
+          </a:stretch>
+        </p:blipFill>
+        <p:spPr bwMode="auto">
           <a:xfrm>
-            <a:off x="4191000" y="4267200"/>
-            <a:ext cx="2468048" cy="923330"/>
+            <a:off x="6248400" y="2409842"/>
+            <a:ext cx="2209800" cy="3029328"/>
           </a:xfrm>
           <a:prstGeom prst="rect">
             <a:avLst/>
           </a:prstGeom>
           <a:noFill/>
+          <a:ln>
+            <a:noFill/>
+          </a:ln>
+          <a:extLst>
+            <a:ext uri="{909E8E84-426E-40DD-AFC4-6F175D3DCCD1}">
+              <a14:hiddenFill xmlns:a14="http://schemas.microsoft.com/office/drawing/2010/main">
+                <a:solidFill>
+                  <a:schemeClr val="accent1"/>
+                </a:solidFill>
+              </a14:hiddenFill>
+            </a:ext>
+            <a:ext uri="{91240B29-F687-4F45-9708-019B960494DF}">
+              <a14:hiddenLine xmlns:a14="http://schemas.microsoft.com/office/drawing/2010/main" w="9525">
+                <a:solidFill>
+                  <a:schemeClr val="tx1"/>
+                </a:solidFill>
+                <a:miter lim="800000"/>
+                <a:headEnd/>
+                <a:tailEnd/>
+              </a14:hiddenLine>
+            </a:ext>
+          </a:extLst>
         </p:spPr>
-        <p:txBody>
-          <a:bodyPr wrap="none" rtlCol="0">
-            <a:spAutoFit/>
-          </a:bodyPr>
-          <a:lstStyle/>
-          <a:p>
-            <a:r>
-              <a:rPr lang="en-US" dirty="0" smtClean="0"/>
-              <a:t>GUI: 3hrs</a:t>
-            </a:r>
-            <a:r>
-              <a:rPr lang="en-US" dirty="0"/>
-              <a:t/>
-            </a:r>
-            <a:br>
-              <a:rPr lang="en-US" dirty="0"/>
-            </a:br>
-            <a:r>
-              <a:rPr lang="en-US" dirty="0" smtClean="0"/>
-              <a:t>Authentication: 2hrs</a:t>
-            </a:r>
-            <a:br>
-              <a:rPr lang="en-US" dirty="0" smtClean="0"/>
-            </a:br>
-            <a:r>
-              <a:rPr lang="en-US" dirty="0" smtClean="0"/>
-              <a:t>Meeting with client 1hr</a:t>
-            </a:r>
-            <a:endParaRPr lang="en-US" dirty="0"/>
-          </a:p>
-        </p:txBody>
-      </p:sp>
+      </p:pic>
     </p:spTree>
     <p:extLst>
       <p:ext uri="{BB962C8B-B14F-4D97-AF65-F5344CB8AC3E}">
-        <p14:creationId xmlns:p14="http://schemas.microsoft.com/office/powerpoint/2010/main" val="3052031811"/>
+        <p14:creationId xmlns:p14="http://schemas.microsoft.com/office/powerpoint/2010/main" val="1578470463"/>
       </p:ext>
     </p:extLst>
   </p:cSld>
@@ -4823,115 +4632,65 @@
           <a:p>
             <a:r>
               <a:rPr lang="en-US" dirty="0" smtClean="0"/>
-              <a:t>Mingle Daily Scrum</a:t>
+              <a:t>Documents</a:t>
             </a:r>
             <a:endParaRPr lang="en-US" dirty="0"/>
           </a:p>
         </p:txBody>
       </p:sp>
-      <p:pic>
-        <p:nvPicPr>
-          <p:cNvPr id="4098" name="Picture 2"/>
-          <p:cNvPicPr>
-            <a:picLocks noChangeAspect="1" noChangeArrowheads="1"/>
-          </p:cNvPicPr>
-          <p:nvPr/>
-        </p:nvPicPr>
-        <p:blipFill>
-          <a:blip r:embed="rId2">
-            <a:extLst>
-              <a:ext uri="{28A0092B-C50C-407E-A947-70E740481C1C}">
-                <a14:useLocalDpi xmlns:a14="http://schemas.microsoft.com/office/drawing/2010/main" val="0"/>
-              </a:ext>
-            </a:extLst>
-          </a:blip>
-          <a:srcRect/>
-          <a:stretch>
-            <a:fillRect/>
-          </a:stretch>
-        </p:blipFill>
-        <p:spPr bwMode="auto">
-          <a:xfrm>
-            <a:off x="1066800" y="1447800"/>
-            <a:ext cx="2286000" cy="4587551"/>
-          </a:xfrm>
-          <a:prstGeom prst="rect">
-            <a:avLst/>
-          </a:prstGeom>
-          <a:noFill/>
-          <a:ln>
-            <a:noFill/>
-          </a:ln>
-          <a:extLst>
-            <a:ext uri="{909E8E84-426E-40DD-AFC4-6F175D3DCCD1}">
-              <a14:hiddenFill xmlns:a14="http://schemas.microsoft.com/office/drawing/2010/main">
-                <a:solidFill>
-                  <a:schemeClr val="accent1"/>
-                </a:solidFill>
-              </a14:hiddenFill>
-            </a:ext>
-            <a:ext uri="{91240B29-F687-4F45-9708-019B960494DF}">
-              <a14:hiddenLine xmlns:a14="http://schemas.microsoft.com/office/drawing/2010/main" w="9525">
-                <a:solidFill>
-                  <a:schemeClr val="tx1"/>
-                </a:solidFill>
-                <a:miter lim="800000"/>
-                <a:headEnd/>
-                <a:tailEnd/>
-              </a14:hiddenLine>
-            </a:ext>
-          </a:extLst>
-        </p:spPr>
-      </p:pic>
-      <p:sp>
-        <p:nvSpPr>
-          <p:cNvPr id="4" name="TextBox 3"/>
-          <p:cNvSpPr txBox="1"/>
-          <p:nvPr/>
-        </p:nvSpPr>
-        <p:spPr>
-          <a:xfrm>
-            <a:off x="3886200" y="1524000"/>
-            <a:ext cx="1211422" cy="4247317"/>
-          </a:xfrm>
-          <a:prstGeom prst="rect">
-            <a:avLst/>
-          </a:prstGeom>
-          <a:noFill/>
-        </p:spPr>
-        <p:txBody>
-          <a:bodyPr wrap="none" rtlCol="0">
-            <a:spAutoFit/>
+      <p:sp>
+        <p:nvSpPr>
+          <p:cNvPr id="3" name="Content Placeholder 2"/>
+          <p:cNvSpPr>
+            <a:spLocks noGrp="1"/>
+          </p:cNvSpPr>
+          <p:nvPr>
+            <p:ph idx="1"/>
+          </p:nvPr>
+        </p:nvSpPr>
+        <p:spPr/>
+        <p:txBody>
+          <a:bodyPr>
+            <a:normAutofit fontScale="92500" lnSpcReduction="20000"/>
           </a:bodyPr>
           <a:lstStyle/>
           <a:p>
             <a:r>
-              <a:rPr lang="en-US" dirty="0" err="1" smtClean="0"/>
-              <a:t>Auth</a:t>
-            </a:r>
-            <a:r>
-              <a:rPr lang="en-US" dirty="0" smtClean="0"/>
-              <a:t> : 4hrs</a:t>
-            </a:r>
-            <a:br>
-              <a:rPr lang="en-US" dirty="0" smtClean="0"/>
-            </a:br>
-            <a:r>
-              <a:rPr lang="en-US" dirty="0" err="1" smtClean="0"/>
-              <a:t>Gui</a:t>
-            </a:r>
-            <a:r>
-              <a:rPr lang="en-US" dirty="0" smtClean="0"/>
-              <a:t>: 1hr</a:t>
-            </a:r>
+              <a:rPr lang="en-US" dirty="0" smtClean="0"/>
+              <a:t>Feasibility Study &amp; Project Plan: not </a:t>
+            </a:r>
+            <a:r>
+              <a:rPr lang="en-US" dirty="0" smtClean="0"/>
+              <a:t>need to changed</a:t>
+            </a:r>
+            <a:endParaRPr lang="en-US" dirty="0" smtClean="0"/>
           </a:p>
           <a:p>
             <a:endParaRPr lang="en-US" dirty="0"/>
           </a:p>
           <a:p>
+            <a:r>
+              <a:rPr lang="en-US" dirty="0" smtClean="0"/>
+              <a:t>Requirement: not </a:t>
+            </a:r>
+            <a:r>
+              <a:rPr lang="en-US" dirty="0" smtClean="0"/>
+              <a:t> need to changed</a:t>
+            </a:r>
+            <a:endParaRPr lang="en-US" dirty="0"/>
+          </a:p>
+          <a:p>
             <a:endParaRPr lang="en-US" dirty="0" smtClean="0"/>
           </a:p>
           <a:p>
+            <a:r>
+              <a:rPr lang="en-US" dirty="0" smtClean="0"/>
+              <a:t>Design: </a:t>
+            </a:r>
+            <a:r>
+              <a:rPr lang="en-US" dirty="0" smtClean="0"/>
+              <a:t>sequence diagram added</a:t>
+            </a:r>
             <a:endParaRPr lang="en-US" dirty="0" smtClean="0"/>
           </a:p>
           <a:p>
@@ -4939,55 +4698,22 @@
           </a:p>
           <a:p>
             <a:r>
-              <a:rPr lang="en-US" dirty="0" err="1" smtClean="0"/>
-              <a:t>Auth</a:t>
-            </a:r>
-            <a:r>
-              <a:rPr lang="en-US" dirty="0" smtClean="0"/>
-              <a:t> : 3hrs</a:t>
-            </a:r>
-            <a:br>
-              <a:rPr lang="en-US" dirty="0" smtClean="0"/>
-            </a:br>
-            <a:r>
-              <a:rPr lang="en-US" dirty="0" err="1" smtClean="0"/>
-              <a:t>Gui</a:t>
-            </a:r>
-            <a:r>
-              <a:rPr lang="en-US" dirty="0" smtClean="0"/>
-              <a:t> : 3hrs</a:t>
-            </a:r>
-          </a:p>
-          <a:p>
+              <a:rPr lang="en-US" dirty="0" smtClean="0"/>
+              <a:t>User Manual : </a:t>
+            </a:r>
+            <a:r>
+              <a:rPr lang="en-US" dirty="0" smtClean="0"/>
+              <a:t>features added</a:t>
+            </a:r>
             <a:endParaRPr lang="en-US" dirty="0"/>
           </a:p>
           <a:p>
             <a:endParaRPr lang="en-US" dirty="0" smtClean="0"/>
           </a:p>
           <a:p>
-            <a:endParaRPr lang="en-US" dirty="0"/>
-          </a:p>
-          <a:p>
-            <a:endParaRPr lang="en-US" dirty="0" smtClean="0"/>
-          </a:p>
-          <a:p>
-            <a:endParaRPr lang="en-US" dirty="0"/>
-          </a:p>
-          <a:p>
-            <a:r>
-              <a:rPr lang="en-US" dirty="0" err="1" smtClean="0"/>
-              <a:t>Auth</a:t>
-            </a:r>
-            <a:r>
-              <a:rPr lang="en-US" dirty="0" smtClean="0"/>
-              <a:t>: 2hrs</a:t>
-            </a:r>
-            <a:br>
-              <a:rPr lang="en-US" dirty="0" smtClean="0"/>
-            </a:br>
-            <a:r>
-              <a:rPr lang="en-US" dirty="0" smtClean="0"/>
-              <a:t>GUI: 2hrs</a:t>
+            <a:r>
+              <a:rPr lang="en-US" dirty="0" smtClean="0"/>
+              <a:t>Installation and maintenance: not changed</a:t>
             </a:r>
             <a:endParaRPr lang="en-US" dirty="0"/>
           </a:p>
@@ -4996,7 +4722,7 @@
     </p:spTree>
     <p:extLst>
       <p:ext uri="{BB962C8B-B14F-4D97-AF65-F5344CB8AC3E}">
-        <p14:creationId xmlns:p14="http://schemas.microsoft.com/office/powerpoint/2010/main" val="2049054643"/>
+        <p14:creationId xmlns:p14="http://schemas.microsoft.com/office/powerpoint/2010/main" val="805683881"/>
       </p:ext>
     </p:extLst>
   </p:cSld>
@@ -5047,7 +4773,7 @@
           <a:p>
             <a:r>
               <a:rPr lang="en-US" dirty="0" smtClean="0"/>
-              <a:t>Mingle Daily Scrum</a:t>
+              <a:t>Show User Info sequence Diagram</a:t>
             </a:r>
             <a:endParaRPr lang="en-US" dirty="0"/>
           </a:p>
@@ -5055,7 +4781,7 @@
       </p:sp>
       <p:pic>
         <p:nvPicPr>
-          <p:cNvPr id="5122" name="Picture 2"/>
+          <p:cNvPr id="4098" name="Picture 2"/>
           <p:cNvPicPr>
             <a:picLocks noChangeAspect="1" noChangeArrowheads="1"/>
           </p:cNvPicPr>
@@ -5076,8 +4802,8 @@
         </p:blipFill>
         <p:spPr bwMode="auto">
           <a:xfrm>
-            <a:off x="1607127" y="1828800"/>
-            <a:ext cx="2362200" cy="3396740"/>
+            <a:off x="138113" y="1295400"/>
+            <a:ext cx="8867775" cy="4676775"/>
           </a:xfrm>
           <a:prstGeom prst="rect">
             <a:avLst/>
@@ -5107,96 +4833,16 @@
           </a:extLst>
         </p:spPr>
       </p:pic>
-      <p:sp>
-        <p:nvSpPr>
-          <p:cNvPr id="4" name="TextBox 3"/>
-          <p:cNvSpPr txBox="1"/>
-          <p:nvPr/>
-        </p:nvSpPr>
-        <p:spPr>
-          <a:xfrm>
-            <a:off x="4572000" y="2209800"/>
-            <a:ext cx="2186689" cy="2585323"/>
-          </a:xfrm>
-          <a:prstGeom prst="rect">
-            <a:avLst/>
-          </a:prstGeom>
-          <a:noFill/>
-        </p:spPr>
-        <p:txBody>
-          <a:bodyPr wrap="none" rtlCol="0">
-            <a:spAutoFit/>
-          </a:bodyPr>
-          <a:lstStyle/>
-          <a:p>
-            <a:r>
-              <a:rPr lang="en-US" dirty="0" err="1" smtClean="0"/>
-              <a:t>Auth</a:t>
-            </a:r>
-            <a:r>
-              <a:rPr lang="en-US" dirty="0" smtClean="0"/>
-              <a:t>: 2hrs</a:t>
-            </a:r>
-            <a:br>
-              <a:rPr lang="en-US" dirty="0" smtClean="0"/>
-            </a:br>
-            <a:r>
-              <a:rPr lang="en-US" dirty="0" smtClean="0"/>
-              <a:t>GUI: 2hrs</a:t>
-            </a:r>
-          </a:p>
-          <a:p>
-            <a:endParaRPr lang="en-US" dirty="0"/>
-          </a:p>
-          <a:p>
-            <a:endParaRPr lang="en-US" dirty="0" smtClean="0"/>
-          </a:p>
-          <a:p>
-            <a:endParaRPr lang="en-US" dirty="0"/>
-          </a:p>
-          <a:p>
-            <a:endParaRPr lang="en-US" dirty="0" smtClean="0"/>
-          </a:p>
-          <a:p>
-            <a:r>
-              <a:rPr lang="en-US" dirty="0" smtClean="0"/>
-              <a:t>GUI: 1hr</a:t>
-            </a:r>
-            <a:br>
-              <a:rPr lang="en-US" dirty="0" smtClean="0"/>
-            </a:br>
-            <a:r>
-              <a:rPr lang="en-US" dirty="0" smtClean="0"/>
-              <a:t>Test: 2hrs</a:t>
-            </a:r>
-            <a:br>
-              <a:rPr lang="en-US" dirty="0" smtClean="0"/>
-            </a:br>
-            <a:r>
-              <a:rPr lang="en-US" dirty="0" smtClean="0"/>
-              <a:t>Meet with Client: 1hr</a:t>
-            </a:r>
-            <a:endParaRPr lang="en-US" dirty="0"/>
-          </a:p>
-        </p:txBody>
-      </p:sp>
     </p:spTree>
     <p:extLst>
       <p:ext uri="{BB962C8B-B14F-4D97-AF65-F5344CB8AC3E}">
-        <p14:creationId xmlns:p14="http://schemas.microsoft.com/office/powerpoint/2010/main" val="765957084"/>
+        <p14:creationId xmlns:p14="http://schemas.microsoft.com/office/powerpoint/2010/main" val="384332931"/>
       </p:ext>
     </p:extLst>
   </p:cSld>
   <p:clrMapOvr>
     <a:masterClrMapping/>
   </p:clrMapOvr>
-  <p:timing>
-    <p:tnLst>
-      <p:par>
-        <p:cTn id="1" dur="indefinite" restart="never" nodeType="tmRoot"/>
-      </p:par>
-    </p:tnLst>
-  </p:timing>
 </p:sld>
 </file>
 
@@ -5234,7 +4880,7 @@
           <a:p>
             <a:r>
               <a:rPr lang="en-US" dirty="0" smtClean="0"/>
-              <a:t>Documents</a:t>
+              <a:t>User Manual</a:t>
             </a:r>
             <a:endParaRPr lang="en-US" dirty="0"/>
           </a:p>
@@ -5252,53 +4898,30 @@
         </p:nvSpPr>
         <p:spPr/>
         <p:txBody>
-          <a:bodyPr>
-            <a:normAutofit fontScale="92500" lnSpcReduction="20000"/>
-          </a:bodyPr>
-          <a:lstStyle/>
-          <a:p>
-            <a:r>
-              <a:rPr lang="en-US" dirty="0" smtClean="0"/>
-              <a:t>Feasibility Study &amp; Project Plan: not changed</a:t>
-            </a:r>
-          </a:p>
-          <a:p>
-            <a:endParaRPr lang="en-US" dirty="0"/>
-          </a:p>
-          <a:p>
-            <a:r>
-              <a:rPr lang="en-US" dirty="0" smtClean="0"/>
-              <a:t>Requirement: not changed</a:t>
-            </a:r>
-            <a:endParaRPr lang="en-US" dirty="0"/>
+          <a:bodyPr/>
+          <a:lstStyle/>
+          <a:p>
+            <a:r>
+              <a:rPr lang="en-US" dirty="0" smtClean="0"/>
+              <a:t>Login feature explained for admins.</a:t>
+            </a:r>
+          </a:p>
+          <a:p>
+            <a:r>
+              <a:rPr lang="en-US" dirty="0" smtClean="0"/>
+              <a:t>Add delete logged in user feature explained</a:t>
+            </a:r>
+          </a:p>
+          <a:p>
+            <a:r>
+              <a:rPr lang="en-US" dirty="0" smtClean="0"/>
+              <a:t>Add, delete, modify users for admins explained.</a:t>
+            </a:r>
           </a:p>
           <a:p>
             <a:endParaRPr lang="en-US" dirty="0" smtClean="0"/>
           </a:p>
           <a:p>
-            <a:r>
-              <a:rPr lang="en-US" dirty="0" smtClean="0"/>
-              <a:t>Design: added the ER diagram</a:t>
-            </a:r>
-          </a:p>
-          <a:p>
-            <a:endParaRPr lang="en-US" dirty="0"/>
-          </a:p>
-          <a:p>
-            <a:r>
-              <a:rPr lang="en-US" dirty="0" smtClean="0"/>
-              <a:t>User Manual : not changed</a:t>
-            </a:r>
-            <a:endParaRPr lang="en-US" dirty="0"/>
-          </a:p>
-          <a:p>
-            <a:endParaRPr lang="en-US" dirty="0" smtClean="0"/>
-          </a:p>
-          <a:p>
-            <a:r>
-              <a:rPr lang="en-US" dirty="0" smtClean="0"/>
-              <a:t>Installation and maintenance: not changed</a:t>
-            </a:r>
             <a:endParaRPr lang="en-US" dirty="0"/>
           </a:p>
         </p:txBody>
@@ -5306,20 +4929,13 @@
     </p:spTree>
     <p:extLst>
       <p:ext uri="{BB962C8B-B14F-4D97-AF65-F5344CB8AC3E}">
-        <p14:creationId xmlns:p14="http://schemas.microsoft.com/office/powerpoint/2010/main" val="805683881"/>
+        <p14:creationId xmlns:p14="http://schemas.microsoft.com/office/powerpoint/2010/main" val="3317093230"/>
       </p:ext>
     </p:extLst>
   </p:cSld>
   <p:clrMapOvr>
     <a:masterClrMapping/>
   </p:clrMapOvr>
-  <p:timing>
-    <p:tnLst>
-      <p:par>
-        <p:cTn id="1" dur="indefinite" restart="never" nodeType="tmRoot"/>
-      </p:par>
-    </p:tnLst>
-  </p:timing>
 </p:sld>
 </file>
 

</xml_diff>

<commit_message>
send msg module done logged in user summary done
</commit_message>
<xml_diff>
--- a/Presentation Slides/Presentation 3.pptx
+++ b/Presentation Slides/Presentation 3.pptx
@@ -10,14 +10,17 @@
     <p:sldId id="257" r:id="rId4"/>
     <p:sldId id="258" r:id="rId5"/>
     <p:sldId id="262" r:id="rId6"/>
-    <p:sldId id="271" r:id="rId7"/>
-    <p:sldId id="272" r:id="rId8"/>
-    <p:sldId id="265" r:id="rId9"/>
-    <p:sldId id="266" r:id="rId10"/>
-    <p:sldId id="267" r:id="rId11"/>
-    <p:sldId id="268" r:id="rId12"/>
-    <p:sldId id="269" r:id="rId13"/>
-    <p:sldId id="270" r:id="rId14"/>
+    <p:sldId id="275" r:id="rId7"/>
+    <p:sldId id="276" r:id="rId8"/>
+    <p:sldId id="271" r:id="rId9"/>
+    <p:sldId id="274" r:id="rId10"/>
+    <p:sldId id="272" r:id="rId11"/>
+    <p:sldId id="265" r:id="rId12"/>
+    <p:sldId id="266" r:id="rId13"/>
+    <p:sldId id="267" r:id="rId14"/>
+    <p:sldId id="268" r:id="rId15"/>
+    <p:sldId id="269" r:id="rId16"/>
+    <p:sldId id="270" r:id="rId17"/>
   </p:sldIdLst>
   <p:sldSz cx="9144000" cy="6858000" type="screen4x3"/>
   <p:notesSz cx="6858000" cy="9144000"/>
@@ -300,7 +303,7 @@
           <a:p>
             <a:fld id="{8F6AC1CF-67FB-4D59-BAA5-1B03B95FE3AB}" type="datetimeFigureOut">
               <a:rPr lang="en-US" smtClean="0"/>
-              <a:t>3/2/2015</a:t>
+              <a:t>3/15/2015</a:t>
             </a:fld>
             <a:endParaRPr lang="en-US"/>
           </a:p>
@@ -470,7 +473,7 @@
           <a:p>
             <a:fld id="{8F6AC1CF-67FB-4D59-BAA5-1B03B95FE3AB}" type="datetimeFigureOut">
               <a:rPr lang="en-US" smtClean="0"/>
-              <a:t>3/2/2015</a:t>
+              <a:t>3/15/2015</a:t>
             </a:fld>
             <a:endParaRPr lang="en-US"/>
           </a:p>
@@ -650,7 +653,7 @@
           <a:p>
             <a:fld id="{8F6AC1CF-67FB-4D59-BAA5-1B03B95FE3AB}" type="datetimeFigureOut">
               <a:rPr lang="en-US" smtClean="0"/>
-              <a:t>3/2/2015</a:t>
+              <a:t>3/15/2015</a:t>
             </a:fld>
             <a:endParaRPr lang="en-US"/>
           </a:p>
@@ -820,7 +823,7 @@
           <a:p>
             <a:fld id="{8F6AC1CF-67FB-4D59-BAA5-1B03B95FE3AB}" type="datetimeFigureOut">
               <a:rPr lang="en-US" smtClean="0"/>
-              <a:t>3/2/2015</a:t>
+              <a:t>3/15/2015</a:t>
             </a:fld>
             <a:endParaRPr lang="en-US"/>
           </a:p>
@@ -1066,7 +1069,7 @@
           <a:p>
             <a:fld id="{8F6AC1CF-67FB-4D59-BAA5-1B03B95FE3AB}" type="datetimeFigureOut">
               <a:rPr lang="en-US" smtClean="0"/>
-              <a:t>3/2/2015</a:t>
+              <a:t>3/15/2015</a:t>
             </a:fld>
             <a:endParaRPr lang="en-US"/>
           </a:p>
@@ -1354,7 +1357,7 @@
           <a:p>
             <a:fld id="{8F6AC1CF-67FB-4D59-BAA5-1B03B95FE3AB}" type="datetimeFigureOut">
               <a:rPr lang="en-US" smtClean="0"/>
-              <a:t>3/2/2015</a:t>
+              <a:t>3/15/2015</a:t>
             </a:fld>
             <a:endParaRPr lang="en-US"/>
           </a:p>
@@ -1776,7 +1779,7 @@
           <a:p>
             <a:fld id="{8F6AC1CF-67FB-4D59-BAA5-1B03B95FE3AB}" type="datetimeFigureOut">
               <a:rPr lang="en-US" smtClean="0"/>
-              <a:t>3/2/2015</a:t>
+              <a:t>3/15/2015</a:t>
             </a:fld>
             <a:endParaRPr lang="en-US"/>
           </a:p>
@@ -1894,7 +1897,7 @@
           <a:p>
             <a:fld id="{8F6AC1CF-67FB-4D59-BAA5-1B03B95FE3AB}" type="datetimeFigureOut">
               <a:rPr lang="en-US" smtClean="0"/>
-              <a:t>3/2/2015</a:t>
+              <a:t>3/15/2015</a:t>
             </a:fld>
             <a:endParaRPr lang="en-US"/>
           </a:p>
@@ -1989,7 +1992,7 @@
           <a:p>
             <a:fld id="{8F6AC1CF-67FB-4D59-BAA5-1B03B95FE3AB}" type="datetimeFigureOut">
               <a:rPr lang="en-US" smtClean="0"/>
-              <a:t>3/2/2015</a:t>
+              <a:t>3/15/2015</a:t>
             </a:fld>
             <a:endParaRPr lang="en-US"/>
           </a:p>
@@ -2266,7 +2269,7 @@
           <a:p>
             <a:fld id="{8F6AC1CF-67FB-4D59-BAA5-1B03B95FE3AB}" type="datetimeFigureOut">
               <a:rPr lang="en-US" smtClean="0"/>
-              <a:t>3/2/2015</a:t>
+              <a:t>3/15/2015</a:t>
             </a:fld>
             <a:endParaRPr lang="en-US"/>
           </a:p>
@@ -2519,7 +2522,7 @@
           <a:p>
             <a:fld id="{8F6AC1CF-67FB-4D59-BAA5-1B03B95FE3AB}" type="datetimeFigureOut">
               <a:rPr lang="en-US" smtClean="0"/>
-              <a:t>3/2/2015</a:t>
+              <a:t>3/15/2015</a:t>
             </a:fld>
             <a:endParaRPr lang="en-US"/>
           </a:p>
@@ -2732,7 +2735,7 @@
           <a:p>
             <a:fld id="{8F6AC1CF-67FB-4D59-BAA5-1B03B95FE3AB}" type="datetimeFigureOut">
               <a:rPr lang="en-US" smtClean="0"/>
-              <a:t>3/2/2015</a:t>
+              <a:t>3/15/2015</a:t>
             </a:fld>
             <a:endParaRPr lang="en-US"/>
           </a:p>
@@ -3223,6 +3226,431 @@
           <a:p>
             <a:r>
               <a:rPr lang="en-US" dirty="0" smtClean="0"/>
+              <a:t>User Manual</a:t>
+            </a:r>
+            <a:endParaRPr lang="en-US" dirty="0"/>
+          </a:p>
+        </p:txBody>
+      </p:sp>
+      <p:sp>
+        <p:nvSpPr>
+          <p:cNvPr id="3" name="Content Placeholder 2"/>
+          <p:cNvSpPr>
+            <a:spLocks noGrp="1"/>
+          </p:cNvSpPr>
+          <p:nvPr>
+            <p:ph idx="1"/>
+          </p:nvPr>
+        </p:nvSpPr>
+        <p:spPr/>
+        <p:txBody>
+          <a:bodyPr/>
+          <a:lstStyle/>
+          <a:p>
+            <a:r>
+              <a:rPr lang="en-US" dirty="0" smtClean="0"/>
+              <a:t>Login feature explained for admins.</a:t>
+            </a:r>
+          </a:p>
+          <a:p>
+            <a:r>
+              <a:rPr lang="en-US" dirty="0" smtClean="0"/>
+              <a:t>Add delete logged in user feature explained</a:t>
+            </a:r>
+          </a:p>
+          <a:p>
+            <a:r>
+              <a:rPr lang="en-US" dirty="0" smtClean="0"/>
+              <a:t>Add, delete, modify users for admins explained.</a:t>
+            </a:r>
+          </a:p>
+          <a:p>
+            <a:endParaRPr lang="en-US" dirty="0" smtClean="0"/>
+          </a:p>
+          <a:p>
+            <a:endParaRPr lang="en-US" dirty="0"/>
+          </a:p>
+        </p:txBody>
+      </p:sp>
+    </p:spTree>
+    <p:extLst>
+      <p:ext uri="{BB962C8B-B14F-4D97-AF65-F5344CB8AC3E}">
+        <p14:creationId xmlns:p14="http://schemas.microsoft.com/office/powerpoint/2010/main" val="3317093230"/>
+      </p:ext>
+    </p:extLst>
+  </p:cSld>
+  <p:clrMapOvr>
+    <a:masterClrMapping/>
+  </p:clrMapOvr>
+</p:sld>
+</file>
+
+<file path=ppt/slides/slide11.xml><?xml version="1.0" encoding="utf-8"?>
+<p:sld xmlns:a="http://schemas.openxmlformats.org/drawingml/2006/main" xmlns:r="http://schemas.openxmlformats.org/officeDocument/2006/relationships" xmlns:p="http://schemas.openxmlformats.org/presentationml/2006/main">
+  <p:cSld>
+    <p:spTree>
+      <p:nvGrpSpPr>
+        <p:cNvPr id="1" name=""/>
+        <p:cNvGrpSpPr/>
+        <p:nvPr/>
+      </p:nvGrpSpPr>
+      <p:grpSpPr>
+        <a:xfrm>
+          <a:off x="0" y="0"/>
+          <a:ext cx="0" cy="0"/>
+          <a:chOff x="0" y="0"/>
+          <a:chExt cx="0" cy="0"/>
+        </a:xfrm>
+      </p:grpSpPr>
+      <p:pic>
+        <p:nvPicPr>
+          <p:cNvPr id="2050" name="Picture 2"/>
+          <p:cNvPicPr>
+            <a:picLocks noChangeAspect="1" noChangeArrowheads="1"/>
+          </p:cNvPicPr>
+          <p:nvPr/>
+        </p:nvPicPr>
+        <p:blipFill>
+          <a:blip r:embed="rId2">
+            <a:extLst>
+              <a:ext uri="{28A0092B-C50C-407E-A947-70E740481C1C}">
+                <a14:useLocalDpi xmlns:a14="http://schemas.microsoft.com/office/drawing/2010/main" val="0"/>
+              </a:ext>
+            </a:extLst>
+          </a:blip>
+          <a:srcRect/>
+          <a:stretch>
+            <a:fillRect/>
+          </a:stretch>
+        </p:blipFill>
+        <p:spPr bwMode="auto">
+          <a:xfrm>
+            <a:off x="685800" y="1371600"/>
+            <a:ext cx="6324600" cy="5245252"/>
+          </a:xfrm>
+          <a:prstGeom prst="rect">
+            <a:avLst/>
+          </a:prstGeom>
+          <a:noFill/>
+          <a:ln>
+            <a:noFill/>
+          </a:ln>
+          <a:extLst>
+            <a:ext uri="{909E8E84-426E-40DD-AFC4-6F175D3DCCD1}">
+              <a14:hiddenFill xmlns:a14="http://schemas.microsoft.com/office/drawing/2010/main">
+                <a:solidFill>
+                  <a:schemeClr val="accent1"/>
+                </a:solidFill>
+              </a14:hiddenFill>
+            </a:ext>
+            <a:ext uri="{91240B29-F687-4F45-9708-019B960494DF}">
+              <a14:hiddenLine xmlns:a14="http://schemas.microsoft.com/office/drawing/2010/main" w="9525">
+                <a:solidFill>
+                  <a:schemeClr val="tx1"/>
+                </a:solidFill>
+                <a:miter lim="800000"/>
+                <a:headEnd/>
+                <a:tailEnd/>
+              </a14:hiddenLine>
+            </a:ext>
+          </a:extLst>
+        </p:spPr>
+      </p:pic>
+      <p:sp>
+        <p:nvSpPr>
+          <p:cNvPr id="2" name="Title 1"/>
+          <p:cNvSpPr>
+            <a:spLocks noGrp="1"/>
+          </p:cNvSpPr>
+          <p:nvPr>
+            <p:ph type="title"/>
+          </p:nvPr>
+        </p:nvSpPr>
+        <p:spPr/>
+        <p:txBody>
+          <a:bodyPr/>
+          <a:lstStyle/>
+          <a:p>
+            <a:r>
+              <a:rPr lang="en-US" dirty="0" err="1" smtClean="0"/>
+              <a:t>BurnDown</a:t>
+            </a:r>
+            <a:r>
+              <a:rPr lang="en-US" dirty="0" smtClean="0"/>
+              <a:t> Chart</a:t>
+            </a:r>
+            <a:endParaRPr lang="en-US" dirty="0"/>
+          </a:p>
+        </p:txBody>
+      </p:sp>
+      <p:sp>
+        <p:nvSpPr>
+          <p:cNvPr id="4" name="TextBox 3"/>
+          <p:cNvSpPr txBox="1"/>
+          <p:nvPr/>
+        </p:nvSpPr>
+        <p:spPr>
+          <a:xfrm>
+            <a:off x="5715000" y="3703721"/>
+            <a:ext cx="2976584" cy="1200329"/>
+          </a:xfrm>
+          <a:prstGeom prst="rect">
+            <a:avLst/>
+          </a:prstGeom>
+          <a:noFill/>
+        </p:spPr>
+        <p:txBody>
+          <a:bodyPr wrap="none" rtlCol="0">
+            <a:spAutoFit/>
+          </a:bodyPr>
+          <a:lstStyle/>
+          <a:p>
+            <a:r>
+              <a:rPr lang="en-US" sz="3600" dirty="0" smtClean="0"/>
+              <a:t>All story points</a:t>
+            </a:r>
+            <a:br>
+              <a:rPr lang="en-US" sz="3600" dirty="0" smtClean="0"/>
+            </a:br>
+            <a:r>
+              <a:rPr lang="en-US" sz="3600" dirty="0" smtClean="0"/>
+              <a:t> were finished</a:t>
+            </a:r>
+            <a:endParaRPr lang="en-US" sz="3600" dirty="0"/>
+          </a:p>
+        </p:txBody>
+      </p:sp>
+    </p:spTree>
+    <p:extLst>
+      <p:ext uri="{BB962C8B-B14F-4D97-AF65-F5344CB8AC3E}">
+        <p14:creationId xmlns:p14="http://schemas.microsoft.com/office/powerpoint/2010/main" val="1775083496"/>
+      </p:ext>
+    </p:extLst>
+  </p:cSld>
+  <p:clrMapOvr>
+    <a:masterClrMapping/>
+  </p:clrMapOvr>
+  <p:timing>
+    <p:tnLst>
+      <p:par>
+        <p:cTn id="1" dur="indefinite" restart="never" nodeType="tmRoot"/>
+      </p:par>
+    </p:tnLst>
+  </p:timing>
+</p:sld>
+</file>
+
+<file path=ppt/slides/slide12.xml><?xml version="1.0" encoding="utf-8"?>
+<p:sld xmlns:a="http://schemas.openxmlformats.org/drawingml/2006/main" xmlns:r="http://schemas.openxmlformats.org/officeDocument/2006/relationships" xmlns:p="http://schemas.openxmlformats.org/presentationml/2006/main">
+  <p:cSld>
+    <p:spTree>
+      <p:nvGrpSpPr>
+        <p:cNvPr id="1" name=""/>
+        <p:cNvGrpSpPr/>
+        <p:nvPr/>
+      </p:nvGrpSpPr>
+      <p:grpSpPr>
+        <a:xfrm>
+          <a:off x="0" y="0"/>
+          <a:ext cx="0" cy="0"/>
+          <a:chOff x="0" y="0"/>
+          <a:chExt cx="0" cy="0"/>
+        </a:xfrm>
+      </p:grpSpPr>
+      <p:sp>
+        <p:nvSpPr>
+          <p:cNvPr id="2" name="Title 1"/>
+          <p:cNvSpPr>
+            <a:spLocks noGrp="1"/>
+          </p:cNvSpPr>
+          <p:nvPr>
+            <p:ph type="title"/>
+          </p:nvPr>
+        </p:nvSpPr>
+        <p:spPr/>
+        <p:txBody>
+          <a:bodyPr/>
+          <a:lstStyle/>
+          <a:p>
+            <a:r>
+              <a:rPr lang="en-US" dirty="0" smtClean="0"/>
+              <a:t>Retrospectives</a:t>
+            </a:r>
+            <a:endParaRPr lang="en-US" dirty="0"/>
+          </a:p>
+        </p:txBody>
+      </p:sp>
+      <p:sp>
+        <p:nvSpPr>
+          <p:cNvPr id="4" name="TextBox 3"/>
+          <p:cNvSpPr txBox="1"/>
+          <p:nvPr/>
+        </p:nvSpPr>
+        <p:spPr>
+          <a:xfrm>
+            <a:off x="2362200" y="4495800"/>
+            <a:ext cx="4876800" cy="2862322"/>
+          </a:xfrm>
+          <a:prstGeom prst="rect">
+            <a:avLst/>
+          </a:prstGeom>
+          <a:noFill/>
+        </p:spPr>
+        <p:txBody>
+          <a:bodyPr wrap="square" rtlCol="0">
+            <a:spAutoFit/>
+          </a:bodyPr>
+          <a:lstStyle/>
+          <a:p>
+            <a:r>
+              <a:rPr lang="en-US" dirty="0" smtClean="0"/>
+              <a:t>Start:</a:t>
+            </a:r>
+          </a:p>
+          <a:p>
+            <a:r>
+              <a:rPr lang="en-US" dirty="0"/>
+              <a:t>need to write in words what I am going to do before doing it</a:t>
+            </a:r>
+          </a:p>
+          <a:p>
+            <a:endParaRPr lang="en-US" dirty="0" smtClean="0"/>
+          </a:p>
+          <a:p>
+            <a:r>
+              <a:rPr lang="en-US" dirty="0" smtClean="0"/>
+              <a:t>Stop</a:t>
+            </a:r>
+          </a:p>
+          <a:p>
+            <a:r>
+              <a:rPr lang="en-US" dirty="0"/>
+              <a:t>need to spend less time into re-factoring and more time into coding other features</a:t>
+            </a:r>
+          </a:p>
+          <a:p>
+            <a:endParaRPr lang="en-US" dirty="0" smtClean="0"/>
+          </a:p>
+          <a:p>
+            <a:pPr marL="285750" indent="-285750">
+              <a:buFontTx/>
+              <a:buChar char="-"/>
+            </a:pPr>
+            <a:endParaRPr lang="en-US" dirty="0"/>
+          </a:p>
+          <a:p>
+            <a:endParaRPr lang="en-US" dirty="0" smtClean="0"/>
+          </a:p>
+        </p:txBody>
+      </p:sp>
+      <p:pic>
+        <p:nvPicPr>
+          <p:cNvPr id="9220" name="Picture 4"/>
+          <p:cNvPicPr>
+            <a:picLocks noChangeAspect="1" noChangeArrowheads="1"/>
+          </p:cNvPicPr>
+          <p:nvPr/>
+        </p:nvPicPr>
+        <p:blipFill>
+          <a:blip r:embed="rId2">
+            <a:extLst>
+              <a:ext uri="{28A0092B-C50C-407E-A947-70E740481C1C}">
+                <a14:useLocalDpi xmlns:a14="http://schemas.microsoft.com/office/drawing/2010/main" val="0"/>
+              </a:ext>
+            </a:extLst>
+          </a:blip>
+          <a:srcRect/>
+          <a:stretch>
+            <a:fillRect/>
+          </a:stretch>
+        </p:blipFill>
+        <p:spPr bwMode="auto">
+          <a:xfrm>
+            <a:off x="1981200" y="1066800"/>
+            <a:ext cx="5029200" cy="3256407"/>
+          </a:xfrm>
+          <a:prstGeom prst="rect">
+            <a:avLst/>
+          </a:prstGeom>
+          <a:noFill/>
+          <a:ln>
+            <a:noFill/>
+          </a:ln>
+          <a:extLst>
+            <a:ext uri="{909E8E84-426E-40DD-AFC4-6F175D3DCCD1}">
+              <a14:hiddenFill xmlns:a14="http://schemas.microsoft.com/office/drawing/2010/main">
+                <a:solidFill>
+                  <a:schemeClr val="accent1"/>
+                </a:solidFill>
+              </a14:hiddenFill>
+            </a:ext>
+            <a:ext uri="{91240B29-F687-4F45-9708-019B960494DF}">
+              <a14:hiddenLine xmlns:a14="http://schemas.microsoft.com/office/drawing/2010/main" w="9525">
+                <a:solidFill>
+                  <a:schemeClr val="tx1"/>
+                </a:solidFill>
+                <a:miter lim="800000"/>
+                <a:headEnd/>
+                <a:tailEnd/>
+              </a14:hiddenLine>
+            </a:ext>
+          </a:extLst>
+        </p:spPr>
+      </p:pic>
+    </p:spTree>
+    <p:extLst>
+      <p:ext uri="{BB962C8B-B14F-4D97-AF65-F5344CB8AC3E}">
+        <p14:creationId xmlns:p14="http://schemas.microsoft.com/office/powerpoint/2010/main" val="725370550"/>
+      </p:ext>
+    </p:extLst>
+  </p:cSld>
+  <p:clrMapOvr>
+    <a:masterClrMapping/>
+  </p:clrMapOvr>
+  <p:timing>
+    <p:tnLst>
+      <p:par>
+        <p:cTn id="1" dur="indefinite" restart="never" nodeType="tmRoot"/>
+      </p:par>
+    </p:tnLst>
+  </p:timing>
+</p:sld>
+</file>
+
+<file path=ppt/slides/slide13.xml><?xml version="1.0" encoding="utf-8"?>
+<p:sld xmlns:a="http://schemas.openxmlformats.org/drawingml/2006/main" xmlns:r="http://schemas.openxmlformats.org/officeDocument/2006/relationships" xmlns:p="http://schemas.openxmlformats.org/presentationml/2006/main">
+  <p:cSld>
+    <p:spTree>
+      <p:nvGrpSpPr>
+        <p:cNvPr id="1" name=""/>
+        <p:cNvGrpSpPr/>
+        <p:nvPr/>
+      </p:nvGrpSpPr>
+      <p:grpSpPr>
+        <a:xfrm>
+          <a:off x="0" y="0"/>
+          <a:ext cx="0" cy="0"/>
+          <a:chOff x="0" y="0"/>
+          <a:chExt cx="0" cy="0"/>
+        </a:xfrm>
+      </p:grpSpPr>
+      <p:sp>
+        <p:nvSpPr>
+          <p:cNvPr id="2" name="Title 1"/>
+          <p:cNvSpPr>
+            <a:spLocks noGrp="1"/>
+          </p:cNvSpPr>
+          <p:nvPr>
+            <p:ph type="title"/>
+          </p:nvPr>
+        </p:nvSpPr>
+        <p:spPr/>
+        <p:txBody>
+          <a:bodyPr/>
+          <a:lstStyle/>
+          <a:p>
+            <a:r>
+              <a:rPr lang="en-US" dirty="0" smtClean="0"/>
               <a:t>Retrospective</a:t>
             </a:r>
             <a:endParaRPr lang="en-US" dirty="0"/>
@@ -3383,7 +3811,7 @@
 </p:sld>
 </file>
 
-<file path=ppt/slides/slide11.xml><?xml version="1.0" encoding="utf-8"?>
+<file path=ppt/slides/slide14.xml><?xml version="1.0" encoding="utf-8"?>
 <p:sld xmlns:a="http://schemas.openxmlformats.org/drawingml/2006/main" xmlns:r="http://schemas.openxmlformats.org/officeDocument/2006/relationships" xmlns:p="http://schemas.openxmlformats.org/presentationml/2006/main">
   <p:cSld>
     <p:spTree>
@@ -3540,7 +3968,7 @@
 </p:sld>
 </file>
 
-<file path=ppt/slides/slide12.xml><?xml version="1.0" encoding="utf-8"?>
+<file path=ppt/slides/slide15.xml><?xml version="1.0" encoding="utf-8"?>
 <p:sld xmlns:a="http://schemas.openxmlformats.org/drawingml/2006/main" xmlns:r="http://schemas.openxmlformats.org/officeDocument/2006/relationships" xmlns:p="http://schemas.openxmlformats.org/presentationml/2006/main">
   <p:cSld>
     <p:spTree>
@@ -3569,7 +3997,7 @@
         </p:nvSpPr>
         <p:spPr>
           <a:xfrm>
-            <a:off x="1524000" y="228600"/>
+            <a:off x="1752600" y="2819400"/>
             <a:ext cx="8229600" cy="1143000"/>
           </a:xfrm>
         </p:spPr>
@@ -3587,7 +4015,7 @@
       </p:sp>
       <p:pic>
         <p:nvPicPr>
-          <p:cNvPr id="3074" name="Picture 2"/>
+          <p:cNvPr id="1026" name="Picture 2"/>
           <p:cNvPicPr>
             <a:picLocks noChangeAspect="1" noChangeArrowheads="1"/>
           </p:cNvPicPr>
@@ -3608,8 +4036,8 @@
         </p:blipFill>
         <p:spPr bwMode="auto">
           <a:xfrm>
-            <a:off x="1143000" y="609600"/>
-            <a:ext cx="1828800" cy="5763025"/>
+            <a:off x="1066800" y="761999"/>
+            <a:ext cx="1676400" cy="5606587"/>
           </a:xfrm>
           <a:prstGeom prst="rect">
             <a:avLst/>
@@ -3659,7 +4087,7 @@
 </p:sld>
 </file>
 
-<file path=ppt/slides/slide13.xml><?xml version="1.0" encoding="utf-8"?>
+<file path=ppt/slides/slide16.xml><?xml version="1.0" encoding="utf-8"?>
 <p:sld xmlns:a="http://schemas.openxmlformats.org/drawingml/2006/main" xmlns:r="http://schemas.openxmlformats.org/officeDocument/2006/relationships" xmlns:p="http://schemas.openxmlformats.org/presentationml/2006/main">
   <p:cSld>
     <p:spTree>
@@ -3868,7 +4296,7 @@
         </p:nvSpPr>
         <p:spPr>
           <a:xfrm>
-            <a:off x="3172421" y="1905000"/>
+            <a:off x="3172421" y="1676400"/>
             <a:ext cx="937564" cy="369332"/>
           </a:xfrm>
           <a:prstGeom prst="rect">
@@ -3902,7 +4330,7 @@
         </p:nvSpPr>
         <p:spPr>
           <a:xfrm>
-            <a:off x="3276599" y="3851380"/>
+            <a:off x="3200400" y="3622780"/>
             <a:ext cx="1046761" cy="369332"/>
           </a:xfrm>
           <a:prstGeom prst="rect">
@@ -4026,7 +4454,7 @@
         </p:nvSpPr>
         <p:spPr>
           <a:xfrm>
-            <a:off x="6184416" y="1905000"/>
+            <a:off x="6184416" y="1676400"/>
             <a:ext cx="937564" cy="369332"/>
           </a:xfrm>
           <a:prstGeom prst="rect">
@@ -4056,7 +4484,7 @@
         </p:nvSpPr>
         <p:spPr>
           <a:xfrm>
-            <a:off x="6172200" y="3810000"/>
+            <a:off x="6096001" y="3581400"/>
             <a:ext cx="1781155" cy="369332"/>
           </a:xfrm>
           <a:prstGeom prst="rect">
@@ -4101,8 +4529,16 @@
           <a:lstStyle/>
           <a:p>
             <a:r>
-              <a:rPr lang="en-US" dirty="0" smtClean="0"/>
-              <a:t>0 points</a:t>
+              <a:rPr lang="en-US" dirty="0"/>
+              <a:t>8</a:t>
+            </a:r>
+            <a:r>
+              <a:rPr lang="en-US" dirty="0" smtClean="0"/>
+              <a:t> </a:t>
+            </a:r>
+            <a:r>
+              <a:rPr lang="en-US" dirty="0" smtClean="0"/>
+              <a:t>points</a:t>
             </a:r>
             <a:endParaRPr lang="en-US" dirty="0"/>
           </a:p>
@@ -4147,7 +4583,7 @@
         <p:spPr>
           <a:xfrm>
             <a:off x="4947228" y="5895109"/>
-            <a:ext cx="963725" cy="923330"/>
+            <a:ext cx="1138453" cy="923330"/>
           </a:xfrm>
           <a:prstGeom prst="rect">
             <a:avLst/>
@@ -4162,21 +4598,153 @@
           <a:p>
             <a:r>
               <a:rPr lang="en-US" dirty="0" smtClean="0"/>
+              <a:t>48</a:t>
+            </a:r>
+            <a:r>
+              <a:rPr lang="en-US" dirty="0" smtClean="0"/>
+              <a:t/>
+            </a:r>
+            <a:br>
+              <a:rPr lang="en-US" dirty="0" smtClean="0"/>
+            </a:br>
+            <a:r>
+              <a:rPr lang="en-US" dirty="0" smtClean="0"/>
+              <a:t>----  =   </a:t>
+            </a:r>
+            <a:r>
+              <a:rPr lang="en-US" dirty="0" smtClean="0"/>
+              <a:t>1.2</a:t>
+            </a:r>
+            <a:r>
+              <a:rPr lang="en-US" dirty="0" smtClean="0"/>
+              <a:t/>
+            </a:r>
+            <a:br>
+              <a:rPr lang="en-US" dirty="0" smtClean="0"/>
+            </a:br>
+            <a:r>
+              <a:rPr lang="en-US" dirty="0" smtClean="0"/>
               <a:t>40</a:t>
             </a:r>
-            <a:br>
-              <a:rPr lang="en-US" dirty="0" smtClean="0"/>
-            </a:br>
-            <a:r>
-              <a:rPr lang="en-US" dirty="0" smtClean="0"/>
-              <a:t>----  =   1</a:t>
-            </a:r>
-            <a:br>
-              <a:rPr lang="en-US" dirty="0" smtClean="0"/>
-            </a:br>
-            <a:r>
-              <a:rPr lang="en-US" dirty="0" smtClean="0"/>
-              <a:t>40</a:t>
+            <a:endParaRPr lang="en-US" dirty="0"/>
+          </a:p>
+        </p:txBody>
+      </p:sp>
+      <p:sp>
+        <p:nvSpPr>
+          <p:cNvPr id="15" name="TextBox 14"/>
+          <p:cNvSpPr txBox="1"/>
+          <p:nvPr/>
+        </p:nvSpPr>
+        <p:spPr>
+          <a:xfrm>
+            <a:off x="3200400" y="2632180"/>
+            <a:ext cx="1046761" cy="369332"/>
+          </a:xfrm>
+          <a:prstGeom prst="rect">
+            <a:avLst/>
+          </a:prstGeom>
+          <a:noFill/>
+        </p:spPr>
+        <p:txBody>
+          <a:bodyPr wrap="none" rtlCol="0">
+            <a:spAutoFit/>
+          </a:bodyPr>
+          <a:lstStyle/>
+          <a:p>
+            <a:r>
+              <a:rPr lang="en-US" dirty="0" smtClean="0"/>
+              <a:t>16 Points</a:t>
+            </a:r>
+            <a:endParaRPr lang="en-US" dirty="0"/>
+          </a:p>
+        </p:txBody>
+      </p:sp>
+      <p:sp>
+        <p:nvSpPr>
+          <p:cNvPr id="16" name="TextBox 15"/>
+          <p:cNvSpPr txBox="1"/>
+          <p:nvPr/>
+        </p:nvSpPr>
+        <p:spPr>
+          <a:xfrm>
+            <a:off x="6096001" y="2590800"/>
+            <a:ext cx="1781155" cy="369332"/>
+          </a:xfrm>
+          <a:prstGeom prst="rect">
+            <a:avLst/>
+          </a:prstGeom>
+          <a:noFill/>
+        </p:spPr>
+        <p:txBody>
+          <a:bodyPr wrap="square" rtlCol="0">
+            <a:spAutoFit/>
+          </a:bodyPr>
+          <a:lstStyle/>
+          <a:p>
+            <a:r>
+              <a:rPr lang="en-US" dirty="0" smtClean="0"/>
+              <a:t>16 points</a:t>
+            </a:r>
+            <a:endParaRPr lang="en-US" dirty="0"/>
+          </a:p>
+        </p:txBody>
+      </p:sp>
+      <p:sp>
+        <p:nvSpPr>
+          <p:cNvPr id="17" name="TextBox 16"/>
+          <p:cNvSpPr txBox="1"/>
+          <p:nvPr/>
+        </p:nvSpPr>
+        <p:spPr>
+          <a:xfrm>
+            <a:off x="3276600" y="4613380"/>
+            <a:ext cx="1046761" cy="369332"/>
+          </a:xfrm>
+          <a:prstGeom prst="rect">
+            <a:avLst/>
+          </a:prstGeom>
+          <a:noFill/>
+        </p:spPr>
+        <p:txBody>
+          <a:bodyPr wrap="none" rtlCol="0">
+            <a:spAutoFit/>
+          </a:bodyPr>
+          <a:lstStyle/>
+          <a:p>
+            <a:r>
+              <a:rPr lang="en-US" dirty="0" smtClean="0"/>
+              <a:t>16 Points</a:t>
+            </a:r>
+            <a:endParaRPr lang="en-US" dirty="0"/>
+          </a:p>
+        </p:txBody>
+      </p:sp>
+      <p:sp>
+        <p:nvSpPr>
+          <p:cNvPr id="18" name="TextBox 17"/>
+          <p:cNvSpPr txBox="1"/>
+          <p:nvPr/>
+        </p:nvSpPr>
+        <p:spPr>
+          <a:xfrm>
+            <a:off x="6172201" y="4572000"/>
+            <a:ext cx="1781155" cy="369332"/>
+          </a:xfrm>
+          <a:prstGeom prst="rect">
+            <a:avLst/>
+          </a:prstGeom>
+          <a:noFill/>
+        </p:spPr>
+        <p:txBody>
+          <a:bodyPr wrap="square" rtlCol="0">
+            <a:spAutoFit/>
+          </a:bodyPr>
+          <a:lstStyle/>
+          <a:p>
+            <a:r>
+              <a:rPr lang="en-US" dirty="0" smtClean="0"/>
+              <a:t>0 points</a:t>
             </a:r>
             <a:endParaRPr lang="en-US" dirty="0"/>
           </a:p>
@@ -4184,7 +4752,7 @@
       </p:sp>
       <p:pic>
         <p:nvPicPr>
-          <p:cNvPr id="3" name="Picture 2"/>
+          <p:cNvPr id="2051" name="Picture 3"/>
           <p:cNvPicPr>
             <a:picLocks noChangeAspect="1" noChangeArrowheads="1"/>
           </p:cNvPicPr>
@@ -4205,8 +4773,8 @@
         </p:blipFill>
         <p:spPr bwMode="auto">
           <a:xfrm>
-            <a:off x="609600" y="745093"/>
-            <a:ext cx="1600200" cy="5671109"/>
+            <a:off x="685800" y="685800"/>
+            <a:ext cx="1524000" cy="5635012"/>
           </a:xfrm>
           <a:prstGeom prst="rect">
             <a:avLst/>
@@ -4236,126 +4804,6 @@
           </a:extLst>
         </p:spPr>
       </p:pic>
-      <p:sp>
-        <p:nvSpPr>
-          <p:cNvPr id="15" name="TextBox 14"/>
-          <p:cNvSpPr txBox="1"/>
-          <p:nvPr/>
-        </p:nvSpPr>
-        <p:spPr>
-          <a:xfrm>
-            <a:off x="3276598" y="2895600"/>
-            <a:ext cx="1046761" cy="369332"/>
-          </a:xfrm>
-          <a:prstGeom prst="rect">
-            <a:avLst/>
-          </a:prstGeom>
-          <a:noFill/>
-        </p:spPr>
-        <p:txBody>
-          <a:bodyPr wrap="none" rtlCol="0">
-            <a:spAutoFit/>
-          </a:bodyPr>
-          <a:lstStyle/>
-          <a:p>
-            <a:r>
-              <a:rPr lang="en-US" dirty="0" smtClean="0"/>
-              <a:t>16 Points</a:t>
-            </a:r>
-            <a:endParaRPr lang="en-US" dirty="0"/>
-          </a:p>
-        </p:txBody>
-      </p:sp>
-      <p:sp>
-        <p:nvSpPr>
-          <p:cNvPr id="16" name="TextBox 15"/>
-          <p:cNvSpPr txBox="1"/>
-          <p:nvPr/>
-        </p:nvSpPr>
-        <p:spPr>
-          <a:xfrm>
-            <a:off x="6172199" y="2854220"/>
-            <a:ext cx="1781155" cy="369332"/>
-          </a:xfrm>
-          <a:prstGeom prst="rect">
-            <a:avLst/>
-          </a:prstGeom>
-          <a:noFill/>
-        </p:spPr>
-        <p:txBody>
-          <a:bodyPr wrap="square" rtlCol="0">
-            <a:spAutoFit/>
-          </a:bodyPr>
-          <a:lstStyle/>
-          <a:p>
-            <a:r>
-              <a:rPr lang="en-US" dirty="0" smtClean="0"/>
-              <a:t>16 points</a:t>
-            </a:r>
-            <a:endParaRPr lang="en-US" dirty="0"/>
-          </a:p>
-        </p:txBody>
-      </p:sp>
-      <p:sp>
-        <p:nvSpPr>
-          <p:cNvPr id="17" name="TextBox 16"/>
-          <p:cNvSpPr txBox="1"/>
-          <p:nvPr/>
-        </p:nvSpPr>
-        <p:spPr>
-          <a:xfrm>
-            <a:off x="3304308" y="4724400"/>
-            <a:ext cx="1046761" cy="369332"/>
-          </a:xfrm>
-          <a:prstGeom prst="rect">
-            <a:avLst/>
-          </a:prstGeom>
-          <a:noFill/>
-        </p:spPr>
-        <p:txBody>
-          <a:bodyPr wrap="none" rtlCol="0">
-            <a:spAutoFit/>
-          </a:bodyPr>
-          <a:lstStyle/>
-          <a:p>
-            <a:r>
-              <a:rPr lang="en-US" dirty="0" smtClean="0"/>
-              <a:t>16 Points</a:t>
-            </a:r>
-            <a:endParaRPr lang="en-US" dirty="0"/>
-          </a:p>
-        </p:txBody>
-      </p:sp>
-      <p:sp>
-        <p:nvSpPr>
-          <p:cNvPr id="18" name="TextBox 17"/>
-          <p:cNvSpPr txBox="1"/>
-          <p:nvPr/>
-        </p:nvSpPr>
-        <p:spPr>
-          <a:xfrm>
-            <a:off x="6199909" y="4683020"/>
-            <a:ext cx="1781155" cy="369332"/>
-          </a:xfrm>
-          <a:prstGeom prst="rect">
-            <a:avLst/>
-          </a:prstGeom>
-          <a:noFill/>
-        </p:spPr>
-        <p:txBody>
-          <a:bodyPr wrap="square" rtlCol="0">
-            <a:spAutoFit/>
-          </a:bodyPr>
-          <a:lstStyle/>
-          <a:p>
-            <a:r>
-              <a:rPr lang="en-US" dirty="0" smtClean="0"/>
-              <a:t>0 points</a:t>
-            </a:r>
-            <a:endParaRPr lang="en-US" dirty="0"/>
-          </a:p>
-        </p:txBody>
-      </p:sp>
     </p:spTree>
     <p:extLst>
       <p:ext uri="{BB962C8B-B14F-4D97-AF65-F5344CB8AC3E}">
@@ -4657,25 +5105,35 @@
           <a:p>
             <a:r>
               <a:rPr lang="en-US" dirty="0" smtClean="0"/>
-              <a:t>Feasibility Study &amp; Project Plan: not </a:t>
-            </a:r>
-            <a:r>
-              <a:rPr lang="en-US" dirty="0" smtClean="0"/>
-              <a:t>need to changed</a:t>
-            </a:r>
+              <a:t>Feasibility Study &amp; Project Plan: not need to changed</a:t>
+            </a:r>
+          </a:p>
+          <a:p>
+            <a:endParaRPr lang="en-US" dirty="0"/>
+          </a:p>
+          <a:p>
+            <a:r>
+              <a:rPr lang="en-US" dirty="0" smtClean="0"/>
+              <a:t>Requirement: not  need to changed</a:t>
+            </a:r>
+            <a:endParaRPr lang="en-US" dirty="0"/>
+          </a:p>
+          <a:p>
             <a:endParaRPr lang="en-US" dirty="0" smtClean="0"/>
           </a:p>
           <a:p>
+            <a:r>
+              <a:rPr lang="en-US" dirty="0" smtClean="0"/>
+              <a:t>Design: sequence diagram added</a:t>
+            </a:r>
+          </a:p>
+          <a:p>
             <a:endParaRPr lang="en-US" dirty="0"/>
           </a:p>
           <a:p>
             <a:r>
               <a:rPr lang="en-US" dirty="0" smtClean="0"/>
-              <a:t>Requirement: not </a:t>
-            </a:r>
-            <a:r>
-              <a:rPr lang="en-US" dirty="0" smtClean="0"/>
-              <a:t> need to changed</a:t>
+              <a:t>User Manual : features added</a:t>
             </a:r>
             <a:endParaRPr lang="en-US" dirty="0"/>
           </a:p>
@@ -4685,35 +5143,11 @@
           <a:p>
             <a:r>
               <a:rPr lang="en-US" dirty="0" smtClean="0"/>
-              <a:t>Design: </a:t>
-            </a:r>
-            <a:r>
-              <a:rPr lang="en-US" dirty="0" smtClean="0"/>
-              <a:t>sequence diagram added</a:t>
-            </a:r>
-            <a:endParaRPr lang="en-US" dirty="0" smtClean="0"/>
-          </a:p>
-          <a:p>
-            <a:endParaRPr lang="en-US" dirty="0"/>
-          </a:p>
-          <a:p>
-            <a:r>
-              <a:rPr lang="en-US" dirty="0" smtClean="0"/>
-              <a:t>User Manual : </a:t>
-            </a:r>
-            <a:r>
-              <a:rPr lang="en-US" dirty="0" smtClean="0"/>
-              <a:t>features added</a:t>
-            </a:r>
-            <a:endParaRPr lang="en-US" dirty="0"/>
-          </a:p>
-          <a:p>
-            <a:endParaRPr lang="en-US" dirty="0" smtClean="0"/>
-          </a:p>
-          <a:p>
-            <a:r>
-              <a:rPr lang="en-US" dirty="0" smtClean="0"/>
-              <a:t>Installation and maintenance: not changed</a:t>
+              <a:t>Installation and maintenance: </a:t>
+            </a:r>
+            <a:r>
+              <a:rPr lang="en-US" dirty="0" smtClean="0"/>
+              <a:t>added</a:t>
             </a:r>
             <a:endParaRPr lang="en-US" dirty="0"/>
           </a:p>
@@ -4773,7 +5207,7 @@
           <a:p>
             <a:r>
               <a:rPr lang="en-US" dirty="0" smtClean="0"/>
-              <a:t>Show User Info sequence Diagram</a:t>
+              <a:t>Invite Use Case</a:t>
             </a:r>
             <a:endParaRPr lang="en-US" dirty="0"/>
           </a:p>
@@ -4781,7 +5215,523 @@
       </p:sp>
       <p:pic>
         <p:nvPicPr>
-          <p:cNvPr id="4098" name="Picture 2"/>
+          <p:cNvPr id="4" name="Picture 3"/>
+          <p:cNvPicPr/>
+          <p:nvPr/>
+        </p:nvPicPr>
+        <p:blipFill>
+          <a:blip r:embed="rId2">
+            <a:extLst>
+              <a:ext uri="{28A0092B-C50C-407E-A947-70E740481C1C}">
+                <a14:useLocalDpi xmlns:a14="http://schemas.microsoft.com/office/drawing/2010/main" val="0"/>
+              </a:ext>
+            </a:extLst>
+          </a:blip>
+          <a:srcRect/>
+          <a:stretch>
+            <a:fillRect/>
+          </a:stretch>
+        </p:blipFill>
+        <p:spPr bwMode="auto">
+          <a:xfrm>
+            <a:off x="838200" y="1219200"/>
+            <a:ext cx="7219659" cy="5219383"/>
+          </a:xfrm>
+          <a:prstGeom prst="rect">
+            <a:avLst/>
+          </a:prstGeom>
+          <a:noFill/>
+          <a:ln>
+            <a:noFill/>
+          </a:ln>
+        </p:spPr>
+      </p:pic>
+    </p:spTree>
+    <p:extLst>
+      <p:ext uri="{BB962C8B-B14F-4D97-AF65-F5344CB8AC3E}">
+        <p14:creationId xmlns:p14="http://schemas.microsoft.com/office/powerpoint/2010/main" val="3198494510"/>
+      </p:ext>
+    </p:extLst>
+  </p:cSld>
+  <p:clrMapOvr>
+    <a:masterClrMapping/>
+  </p:clrMapOvr>
+</p:sld>
+</file>
+
+<file path=ppt/slides/slide7.xml><?xml version="1.0" encoding="utf-8"?>
+<p:sld xmlns:a="http://schemas.openxmlformats.org/drawingml/2006/main" xmlns:r="http://schemas.openxmlformats.org/officeDocument/2006/relationships" xmlns:p="http://schemas.openxmlformats.org/presentationml/2006/main">
+  <p:cSld>
+    <p:spTree>
+      <p:nvGrpSpPr>
+        <p:cNvPr id="1" name=""/>
+        <p:cNvGrpSpPr/>
+        <p:nvPr/>
+      </p:nvGrpSpPr>
+      <p:grpSpPr>
+        <a:xfrm>
+          <a:off x="0" y="0"/>
+          <a:ext cx="0" cy="0"/>
+          <a:chOff x="0" y="0"/>
+          <a:chExt cx="0" cy="0"/>
+        </a:xfrm>
+      </p:grpSpPr>
+      <p:sp>
+        <p:nvSpPr>
+          <p:cNvPr id="2" name="Title 1"/>
+          <p:cNvSpPr>
+            <a:spLocks noGrp="1"/>
+          </p:cNvSpPr>
+          <p:nvPr>
+            <p:ph type="title"/>
+          </p:nvPr>
+        </p:nvSpPr>
+        <p:spPr/>
+        <p:txBody>
+          <a:bodyPr/>
+          <a:lstStyle/>
+          <a:p>
+            <a:r>
+              <a:rPr lang="en-US" dirty="0" smtClean="0"/>
+              <a:t>Use Case</a:t>
+            </a:r>
+            <a:endParaRPr lang="en-US" dirty="0"/>
+          </a:p>
+        </p:txBody>
+      </p:sp>
+      <p:graphicFrame>
+        <p:nvGraphicFramePr>
+          <p:cNvPr id="4" name="Table 3"/>
+          <p:cNvGraphicFramePr>
+            <a:graphicFrameLocks noGrp="1"/>
+          </p:cNvGraphicFramePr>
+          <p:nvPr>
+            <p:extLst>
+              <p:ext uri="{D42A27DB-BD31-4B8C-83A1-F6EECF244321}">
+                <p14:modId xmlns:p14="http://schemas.microsoft.com/office/powerpoint/2010/main" val="131920015"/>
+              </p:ext>
+            </p:extLst>
+          </p:nvPr>
+        </p:nvGraphicFramePr>
+        <p:xfrm>
+          <a:off x="914400" y="1371600"/>
+          <a:ext cx="7467600" cy="4876800"/>
+        </p:xfrm>
+        <a:graphic>
+          <a:graphicData uri="http://schemas.openxmlformats.org/drawingml/2006/table">
+            <a:tbl>
+              <a:tblPr firstRow="1" firstCol="1" bandRow="1">
+                <a:tableStyleId>{93296810-A885-4BE3-A3E7-6D5BEEA58F35}</a:tableStyleId>
+              </a:tblPr>
+              <a:tblGrid>
+                <a:gridCol w="7467600"/>
+              </a:tblGrid>
+              <a:tr h="229189">
+                <a:tc>
+                  <a:txBody>
+                    <a:bodyPr/>
+                    <a:lstStyle/>
+                    <a:p>
+                      <a:pPr marL="0" marR="0">
+                        <a:lnSpc>
+                          <a:spcPct val="115000"/>
+                        </a:lnSpc>
+                        <a:spcBef>
+                          <a:spcPts val="600"/>
+                        </a:spcBef>
+                        <a:spcAft>
+                          <a:spcPts val="600"/>
+                        </a:spcAft>
+                      </a:pPr>
+                      <a:r>
+                        <a:rPr lang="en-US" sz="1100" dirty="0">
+                          <a:effectLst/>
+                        </a:rPr>
+                        <a:t>Name: 175_createUser</a:t>
+                      </a:r>
+                      <a:endParaRPr lang="en-US" sz="1100" dirty="0">
+                        <a:effectLst/>
+                        <a:latin typeface="Calibri"/>
+                        <a:ea typeface="Calibri"/>
+                        <a:cs typeface="Times New Roman"/>
+                      </a:endParaRPr>
+                    </a:p>
+                  </a:txBody>
+                  <a:tcPr marL="68580" marR="68580" marT="0" marB="0"/>
+                </a:tc>
+              </a:tr>
+              <a:tr h="229189">
+                <a:tc>
+                  <a:txBody>
+                    <a:bodyPr/>
+                    <a:lstStyle/>
+                    <a:p>
+                      <a:pPr marL="0" marR="0">
+                        <a:lnSpc>
+                          <a:spcPct val="115000"/>
+                        </a:lnSpc>
+                        <a:spcBef>
+                          <a:spcPts val="600"/>
+                        </a:spcBef>
+                        <a:spcAft>
+                          <a:spcPts val="600"/>
+                        </a:spcAft>
+                      </a:pPr>
+                      <a:r>
+                        <a:rPr lang="en-US" sz="1100">
+                          <a:effectLst/>
+                        </a:rPr>
+                        <a:t>Participating actor: admin user</a:t>
+                      </a:r>
+                      <a:endParaRPr lang="en-US" sz="1100">
+                        <a:effectLst/>
+                        <a:latin typeface="Calibri"/>
+                        <a:ea typeface="Calibri"/>
+                        <a:cs typeface="Times New Roman"/>
+                      </a:endParaRPr>
+                    </a:p>
+                  </a:txBody>
+                  <a:tcPr marL="68580" marR="68580" marT="0" marB="0"/>
+                </a:tc>
+              </a:tr>
+              <a:tr h="1536961">
+                <a:tc>
+                  <a:txBody>
+                    <a:bodyPr/>
+                    <a:lstStyle/>
+                    <a:p>
+                      <a:pPr marL="0" marR="0">
+                        <a:lnSpc>
+                          <a:spcPct val="115000"/>
+                        </a:lnSpc>
+                        <a:spcBef>
+                          <a:spcPts val="600"/>
+                        </a:spcBef>
+                        <a:spcAft>
+                          <a:spcPts val="600"/>
+                        </a:spcAft>
+                      </a:pPr>
+                      <a:r>
+                        <a:rPr lang="en-US" sz="1100">
+                          <a:effectLst/>
+                        </a:rPr>
+                        <a:t>Entry condition: </a:t>
+                      </a:r>
+                    </a:p>
+                    <a:p>
+                      <a:pPr marL="342900" marR="0" lvl="0" indent="-342900">
+                        <a:lnSpc>
+                          <a:spcPct val="115000"/>
+                        </a:lnSpc>
+                        <a:spcBef>
+                          <a:spcPts val="600"/>
+                        </a:spcBef>
+                        <a:spcAft>
+                          <a:spcPts val="600"/>
+                        </a:spcAft>
+                        <a:buFont typeface="Calibri"/>
+                        <a:buChar char="-"/>
+                      </a:pPr>
+                      <a:r>
+                        <a:rPr lang="en-US" sz="1100">
+                          <a:effectLst/>
+                        </a:rPr>
+                        <a:t>User is logged in the system</a:t>
+                      </a:r>
+                    </a:p>
+                    <a:p>
+                      <a:pPr marL="342900" marR="0" lvl="0" indent="-342900">
+                        <a:lnSpc>
+                          <a:spcPct val="115000"/>
+                        </a:lnSpc>
+                        <a:spcBef>
+                          <a:spcPts val="600"/>
+                        </a:spcBef>
+                        <a:spcAft>
+                          <a:spcPts val="600"/>
+                        </a:spcAft>
+                        <a:buFont typeface="Calibri"/>
+                        <a:buChar char="-"/>
+                      </a:pPr>
+                      <a:r>
+                        <a:rPr lang="en-US" sz="1100">
+                          <a:effectLst/>
+                        </a:rPr>
+                        <a:t>User is in their account home page.</a:t>
+                      </a:r>
+                    </a:p>
+                    <a:p>
+                      <a:pPr marL="342900" marR="0" lvl="0" indent="-342900">
+                        <a:lnSpc>
+                          <a:spcPct val="115000"/>
+                        </a:lnSpc>
+                        <a:spcBef>
+                          <a:spcPts val="600"/>
+                        </a:spcBef>
+                        <a:spcAft>
+                          <a:spcPts val="600"/>
+                        </a:spcAft>
+                        <a:buFont typeface="Calibri"/>
+                        <a:buChar char="-"/>
+                      </a:pPr>
+                      <a:r>
+                        <a:rPr lang="en-US" sz="1100">
+                          <a:effectLst/>
+                        </a:rPr>
+                        <a:t>User has admin rights</a:t>
+                      </a:r>
+                      <a:endParaRPr lang="en-US" sz="1100">
+                        <a:effectLst/>
+                        <a:latin typeface="Calibri"/>
+                        <a:ea typeface="Calibri"/>
+                        <a:cs typeface="Times New Roman"/>
+                      </a:endParaRPr>
+                    </a:p>
+                  </a:txBody>
+                  <a:tcPr marL="68580" marR="68580" marT="0" marB="0"/>
+                </a:tc>
+              </a:tr>
+              <a:tr h="229189">
+                <a:tc>
+                  <a:txBody>
+                    <a:bodyPr/>
+                    <a:lstStyle/>
+                    <a:p>
+                      <a:pPr marL="0" marR="0">
+                        <a:lnSpc>
+                          <a:spcPct val="115000"/>
+                        </a:lnSpc>
+                        <a:spcBef>
+                          <a:spcPts val="600"/>
+                        </a:spcBef>
+                        <a:spcAft>
+                          <a:spcPts val="600"/>
+                        </a:spcAft>
+                      </a:pPr>
+                      <a:r>
+                        <a:rPr lang="en-US" sz="1100">
+                          <a:effectLst/>
+                        </a:rPr>
+                        <a:t>Exit condition: User invite is sent</a:t>
+                      </a:r>
+                      <a:endParaRPr lang="en-US" sz="1100">
+                        <a:effectLst/>
+                        <a:latin typeface="Calibri"/>
+                        <a:ea typeface="Calibri"/>
+                        <a:cs typeface="Times New Roman"/>
+                      </a:endParaRPr>
+                    </a:p>
+                  </a:txBody>
+                  <a:tcPr marL="68580" marR="68580" marT="0" marB="0"/>
+                </a:tc>
+              </a:tr>
+              <a:tr h="2652272">
+                <a:tc>
+                  <a:txBody>
+                    <a:bodyPr/>
+                    <a:lstStyle/>
+                    <a:p>
+                      <a:pPr marL="0" marR="0">
+                        <a:lnSpc>
+                          <a:spcPct val="115000"/>
+                        </a:lnSpc>
+                        <a:spcBef>
+                          <a:spcPts val="600"/>
+                        </a:spcBef>
+                        <a:spcAft>
+                          <a:spcPts val="600"/>
+                        </a:spcAft>
+                      </a:pPr>
+                      <a:r>
+                        <a:rPr lang="en-US" sz="1100" dirty="0">
+                          <a:effectLst/>
+                        </a:rPr>
+                        <a:t>Event flow:</a:t>
+                      </a:r>
+                    </a:p>
+                    <a:p>
+                      <a:pPr marL="342900" marR="0" lvl="0" indent="-342900">
+                        <a:lnSpc>
+                          <a:spcPct val="115000"/>
+                        </a:lnSpc>
+                        <a:spcBef>
+                          <a:spcPts val="600"/>
+                        </a:spcBef>
+                        <a:spcAft>
+                          <a:spcPts val="600"/>
+                        </a:spcAft>
+                        <a:buFont typeface="+mj-lt"/>
+                        <a:buAutoNum type="arabicPeriod"/>
+                      </a:pPr>
+                      <a:r>
+                        <a:rPr lang="en-US" sz="1100" dirty="0">
+                          <a:effectLst/>
+                        </a:rPr>
+                        <a:t>User click on the Manage User option on the right side menu</a:t>
+                      </a:r>
+                    </a:p>
+                    <a:p>
+                      <a:pPr marL="342900" marR="0" lvl="0" indent="-342900">
+                        <a:lnSpc>
+                          <a:spcPct val="115000"/>
+                        </a:lnSpc>
+                        <a:spcBef>
+                          <a:spcPts val="600"/>
+                        </a:spcBef>
+                        <a:spcAft>
+                          <a:spcPts val="600"/>
+                        </a:spcAft>
+                        <a:buFont typeface="+mj-lt"/>
+                        <a:buAutoNum type="arabicPeriod"/>
+                      </a:pPr>
+                      <a:r>
+                        <a:rPr lang="en-US" sz="1100" dirty="0">
+                          <a:effectLst/>
+                        </a:rPr>
+                        <a:t>System goes to the controller which return to the user management page </a:t>
+                      </a:r>
+                    </a:p>
+                    <a:p>
+                      <a:pPr marL="342900" marR="0" lvl="0" indent="-342900">
+                        <a:lnSpc>
+                          <a:spcPct val="115000"/>
+                        </a:lnSpc>
+                        <a:spcBef>
+                          <a:spcPts val="600"/>
+                        </a:spcBef>
+                        <a:spcAft>
+                          <a:spcPts val="600"/>
+                        </a:spcAft>
+                        <a:buFont typeface="+mj-lt"/>
+                        <a:buAutoNum type="arabicPeriod"/>
+                      </a:pPr>
+                      <a:r>
+                        <a:rPr lang="en-US" sz="1100" dirty="0">
+                          <a:effectLst/>
+                        </a:rPr>
+                        <a:t>User enter the email of the user to be invited</a:t>
+                      </a:r>
+                    </a:p>
+                    <a:p>
+                      <a:pPr marL="342900" marR="0" lvl="0" indent="-342900">
+                        <a:lnSpc>
+                          <a:spcPct val="115000"/>
+                        </a:lnSpc>
+                        <a:spcBef>
+                          <a:spcPts val="600"/>
+                        </a:spcBef>
+                        <a:spcAft>
+                          <a:spcPts val="600"/>
+                        </a:spcAft>
+                        <a:buFont typeface="+mj-lt"/>
+                        <a:buAutoNum type="arabicPeriod"/>
+                      </a:pPr>
+                      <a:r>
+                        <a:rPr lang="en-US" sz="1100" dirty="0">
+                          <a:effectLst/>
+                        </a:rPr>
+                        <a:t>User clicks the invite button.</a:t>
+                      </a:r>
+                    </a:p>
+                    <a:p>
+                      <a:pPr marL="342900" marR="0" lvl="0" indent="-342900">
+                        <a:lnSpc>
+                          <a:spcPct val="115000"/>
+                        </a:lnSpc>
+                        <a:spcBef>
+                          <a:spcPts val="600"/>
+                        </a:spcBef>
+                        <a:spcAft>
+                          <a:spcPts val="600"/>
+                        </a:spcAft>
+                        <a:buFont typeface="+mj-lt"/>
+                        <a:buAutoNum type="arabicPeriod"/>
+                      </a:pPr>
+                      <a:r>
+                        <a:rPr lang="en-US" sz="1100" dirty="0">
+                          <a:effectLst/>
+                        </a:rPr>
+                        <a:t>System sends an email to the user and adds the invitation to the database to later be recognized</a:t>
+                      </a:r>
+                      <a:endParaRPr lang="en-US" sz="1100" dirty="0">
+                        <a:effectLst/>
+                        <a:latin typeface="Calibri"/>
+                        <a:ea typeface="Calibri"/>
+                        <a:cs typeface="Times New Roman"/>
+                      </a:endParaRPr>
+                    </a:p>
+                  </a:txBody>
+                  <a:tcPr marL="68580" marR="68580" marT="0" marB="0"/>
+                </a:tc>
+              </a:tr>
+            </a:tbl>
+          </a:graphicData>
+        </a:graphic>
+      </p:graphicFrame>
+    </p:spTree>
+    <p:extLst>
+      <p:ext uri="{BB962C8B-B14F-4D97-AF65-F5344CB8AC3E}">
+        <p14:creationId xmlns:p14="http://schemas.microsoft.com/office/powerpoint/2010/main" val="1517466241"/>
+      </p:ext>
+    </p:extLst>
+  </p:cSld>
+  <p:clrMapOvr>
+    <a:masterClrMapping/>
+  </p:clrMapOvr>
+</p:sld>
+</file>
+
+<file path=ppt/slides/slide8.xml><?xml version="1.0" encoding="utf-8"?>
+<p:sld xmlns:a="http://schemas.openxmlformats.org/drawingml/2006/main" xmlns:r="http://schemas.openxmlformats.org/officeDocument/2006/relationships" xmlns:p="http://schemas.openxmlformats.org/presentationml/2006/main">
+  <p:cSld>
+    <p:spTree>
+      <p:nvGrpSpPr>
+        <p:cNvPr id="1" name=""/>
+        <p:cNvGrpSpPr/>
+        <p:nvPr/>
+      </p:nvGrpSpPr>
+      <p:grpSpPr>
+        <a:xfrm>
+          <a:off x="0" y="0"/>
+          <a:ext cx="0" cy="0"/>
+          <a:chOff x="0" y="0"/>
+          <a:chExt cx="0" cy="0"/>
+        </a:xfrm>
+      </p:grpSpPr>
+      <p:sp>
+        <p:nvSpPr>
+          <p:cNvPr id="2" name="Title 1"/>
+          <p:cNvSpPr>
+            <a:spLocks noGrp="1"/>
+          </p:cNvSpPr>
+          <p:nvPr>
+            <p:ph type="title"/>
+          </p:nvPr>
+        </p:nvSpPr>
+        <p:spPr/>
+        <p:txBody>
+          <a:bodyPr/>
+          <a:lstStyle/>
+          <a:p>
+            <a:r>
+              <a:rPr lang="en-US" dirty="0" smtClean="0"/>
+              <a:t>Invite new user </a:t>
+            </a:r>
+            <a:r>
+              <a:rPr lang="en-US" dirty="0" smtClean="0"/>
+              <a:t>sequence </a:t>
+            </a:r>
+            <a:r>
+              <a:rPr lang="en-US" dirty="0" smtClean="0"/>
+              <a:t>Diagram</a:t>
+            </a:r>
+            <a:endParaRPr lang="en-US" dirty="0"/>
+          </a:p>
+        </p:txBody>
+      </p:sp>
+      <p:pic>
+        <p:nvPicPr>
+          <p:cNvPr id="3074" name="Picture 2"/>
           <p:cNvPicPr>
             <a:picLocks noChangeAspect="1" noChangeArrowheads="1"/>
           </p:cNvPicPr>
@@ -4802,8 +5752,8 @@
         </p:blipFill>
         <p:spPr bwMode="auto">
           <a:xfrm>
-            <a:off x="138113" y="1295400"/>
-            <a:ext cx="8867775" cy="4676775"/>
+            <a:off x="1600200" y="1371600"/>
+            <a:ext cx="5943600" cy="4114800"/>
           </a:xfrm>
           <a:prstGeom prst="rect">
             <a:avLst/>
@@ -4833,6 +5783,36 @@
           </a:extLst>
         </p:spPr>
       </p:pic>
+      <p:sp>
+        <p:nvSpPr>
+          <p:cNvPr id="3" name="TextBox 2"/>
+          <p:cNvSpPr txBox="1"/>
+          <p:nvPr/>
+        </p:nvSpPr>
+        <p:spPr>
+          <a:xfrm>
+            <a:off x="2526475" y="2538350"/>
+            <a:ext cx="540533" cy="246221"/>
+          </a:xfrm>
+          <a:prstGeom prst="rect">
+            <a:avLst/>
+          </a:prstGeom>
+          <a:noFill/>
+        </p:spPr>
+        <p:txBody>
+          <a:bodyPr wrap="none" rtlCol="0">
+            <a:spAutoFit/>
+          </a:bodyPr>
+          <a:lstStyle/>
+          <a:p>
+            <a:r>
+              <a:rPr lang="en-US" sz="1000" dirty="0" smtClean="0"/>
+              <a:t>Login()</a:t>
+            </a:r>
+            <a:endParaRPr lang="en-US" sz="1000" dirty="0"/>
+          </a:p>
+        </p:txBody>
+      </p:sp>
     </p:spTree>
     <p:extLst>
       <p:ext uri="{BB962C8B-B14F-4D97-AF65-F5344CB8AC3E}">
@@ -4843,254 +5823,6 @@
   <p:clrMapOvr>
     <a:masterClrMapping/>
   </p:clrMapOvr>
-</p:sld>
-</file>
-
-<file path=ppt/slides/slide7.xml><?xml version="1.0" encoding="utf-8"?>
-<p:sld xmlns:a="http://schemas.openxmlformats.org/drawingml/2006/main" xmlns:r="http://schemas.openxmlformats.org/officeDocument/2006/relationships" xmlns:p="http://schemas.openxmlformats.org/presentationml/2006/main">
-  <p:cSld>
-    <p:spTree>
-      <p:nvGrpSpPr>
-        <p:cNvPr id="1" name=""/>
-        <p:cNvGrpSpPr/>
-        <p:nvPr/>
-      </p:nvGrpSpPr>
-      <p:grpSpPr>
-        <a:xfrm>
-          <a:off x="0" y="0"/>
-          <a:ext cx="0" cy="0"/>
-          <a:chOff x="0" y="0"/>
-          <a:chExt cx="0" cy="0"/>
-        </a:xfrm>
-      </p:grpSpPr>
-      <p:sp>
-        <p:nvSpPr>
-          <p:cNvPr id="2" name="Title 1"/>
-          <p:cNvSpPr>
-            <a:spLocks noGrp="1"/>
-          </p:cNvSpPr>
-          <p:nvPr>
-            <p:ph type="title"/>
-          </p:nvPr>
-        </p:nvSpPr>
-        <p:spPr/>
-        <p:txBody>
-          <a:bodyPr/>
-          <a:lstStyle/>
-          <a:p>
-            <a:r>
-              <a:rPr lang="en-US" dirty="0" smtClean="0"/>
-              <a:t>User Manual</a:t>
-            </a:r>
-            <a:endParaRPr lang="en-US" dirty="0"/>
-          </a:p>
-        </p:txBody>
-      </p:sp>
-      <p:sp>
-        <p:nvSpPr>
-          <p:cNvPr id="3" name="Content Placeholder 2"/>
-          <p:cNvSpPr>
-            <a:spLocks noGrp="1"/>
-          </p:cNvSpPr>
-          <p:nvPr>
-            <p:ph idx="1"/>
-          </p:nvPr>
-        </p:nvSpPr>
-        <p:spPr/>
-        <p:txBody>
-          <a:bodyPr/>
-          <a:lstStyle/>
-          <a:p>
-            <a:r>
-              <a:rPr lang="en-US" dirty="0" smtClean="0"/>
-              <a:t>Login feature explained for admins.</a:t>
-            </a:r>
-          </a:p>
-          <a:p>
-            <a:r>
-              <a:rPr lang="en-US" dirty="0" smtClean="0"/>
-              <a:t>Add delete logged in user feature explained</a:t>
-            </a:r>
-          </a:p>
-          <a:p>
-            <a:r>
-              <a:rPr lang="en-US" dirty="0" smtClean="0"/>
-              <a:t>Add, delete, modify users for admins explained.</a:t>
-            </a:r>
-          </a:p>
-          <a:p>
-            <a:endParaRPr lang="en-US" dirty="0" smtClean="0"/>
-          </a:p>
-          <a:p>
-            <a:endParaRPr lang="en-US" dirty="0"/>
-          </a:p>
-        </p:txBody>
-      </p:sp>
-    </p:spTree>
-    <p:extLst>
-      <p:ext uri="{BB962C8B-B14F-4D97-AF65-F5344CB8AC3E}">
-        <p14:creationId xmlns:p14="http://schemas.microsoft.com/office/powerpoint/2010/main" val="3317093230"/>
-      </p:ext>
-    </p:extLst>
-  </p:cSld>
-  <p:clrMapOvr>
-    <a:masterClrMapping/>
-  </p:clrMapOvr>
-</p:sld>
-</file>
-
-<file path=ppt/slides/slide8.xml><?xml version="1.0" encoding="utf-8"?>
-<p:sld xmlns:a="http://schemas.openxmlformats.org/drawingml/2006/main" xmlns:r="http://schemas.openxmlformats.org/officeDocument/2006/relationships" xmlns:p="http://schemas.openxmlformats.org/presentationml/2006/main">
-  <p:cSld>
-    <p:spTree>
-      <p:nvGrpSpPr>
-        <p:cNvPr id="1" name=""/>
-        <p:cNvGrpSpPr/>
-        <p:nvPr/>
-      </p:nvGrpSpPr>
-      <p:grpSpPr>
-        <a:xfrm>
-          <a:off x="0" y="0"/>
-          <a:ext cx="0" cy="0"/>
-          <a:chOff x="0" y="0"/>
-          <a:chExt cx="0" cy="0"/>
-        </a:xfrm>
-      </p:grpSpPr>
-      <p:pic>
-        <p:nvPicPr>
-          <p:cNvPr id="2050" name="Picture 2"/>
-          <p:cNvPicPr>
-            <a:picLocks noChangeAspect="1" noChangeArrowheads="1"/>
-          </p:cNvPicPr>
-          <p:nvPr/>
-        </p:nvPicPr>
-        <p:blipFill>
-          <a:blip r:embed="rId2">
-            <a:extLst>
-              <a:ext uri="{28A0092B-C50C-407E-A947-70E740481C1C}">
-                <a14:useLocalDpi xmlns:a14="http://schemas.microsoft.com/office/drawing/2010/main" val="0"/>
-              </a:ext>
-            </a:extLst>
-          </a:blip>
-          <a:srcRect/>
-          <a:stretch>
-            <a:fillRect/>
-          </a:stretch>
-        </p:blipFill>
-        <p:spPr bwMode="auto">
-          <a:xfrm>
-            <a:off x="685800" y="1371600"/>
-            <a:ext cx="6324600" cy="5245252"/>
-          </a:xfrm>
-          <a:prstGeom prst="rect">
-            <a:avLst/>
-          </a:prstGeom>
-          <a:noFill/>
-          <a:ln>
-            <a:noFill/>
-          </a:ln>
-          <a:extLst>
-            <a:ext uri="{909E8E84-426E-40DD-AFC4-6F175D3DCCD1}">
-              <a14:hiddenFill xmlns:a14="http://schemas.microsoft.com/office/drawing/2010/main">
-                <a:solidFill>
-                  <a:schemeClr val="accent1"/>
-                </a:solidFill>
-              </a14:hiddenFill>
-            </a:ext>
-            <a:ext uri="{91240B29-F687-4F45-9708-019B960494DF}">
-              <a14:hiddenLine xmlns:a14="http://schemas.microsoft.com/office/drawing/2010/main" w="9525">
-                <a:solidFill>
-                  <a:schemeClr val="tx1"/>
-                </a:solidFill>
-                <a:miter lim="800000"/>
-                <a:headEnd/>
-                <a:tailEnd/>
-              </a14:hiddenLine>
-            </a:ext>
-          </a:extLst>
-        </p:spPr>
-      </p:pic>
-      <p:sp>
-        <p:nvSpPr>
-          <p:cNvPr id="2" name="Title 1"/>
-          <p:cNvSpPr>
-            <a:spLocks noGrp="1"/>
-          </p:cNvSpPr>
-          <p:nvPr>
-            <p:ph type="title"/>
-          </p:nvPr>
-        </p:nvSpPr>
-        <p:spPr/>
-        <p:txBody>
-          <a:bodyPr/>
-          <a:lstStyle/>
-          <a:p>
-            <a:r>
-              <a:rPr lang="en-US" dirty="0" err="1" smtClean="0"/>
-              <a:t>BurnDown</a:t>
-            </a:r>
-            <a:r>
-              <a:rPr lang="en-US" dirty="0" smtClean="0"/>
-              <a:t> Chart</a:t>
-            </a:r>
-            <a:endParaRPr lang="en-US" dirty="0"/>
-          </a:p>
-        </p:txBody>
-      </p:sp>
-      <p:sp>
-        <p:nvSpPr>
-          <p:cNvPr id="4" name="TextBox 3"/>
-          <p:cNvSpPr txBox="1"/>
-          <p:nvPr/>
-        </p:nvSpPr>
-        <p:spPr>
-          <a:xfrm>
-            <a:off x="5715000" y="3703721"/>
-            <a:ext cx="2976584" cy="1200329"/>
-          </a:xfrm>
-          <a:prstGeom prst="rect">
-            <a:avLst/>
-          </a:prstGeom>
-          <a:noFill/>
-        </p:spPr>
-        <p:txBody>
-          <a:bodyPr wrap="none" rtlCol="0">
-            <a:spAutoFit/>
-          </a:bodyPr>
-          <a:lstStyle/>
-          <a:p>
-            <a:r>
-              <a:rPr lang="en-US" sz="3600" dirty="0" smtClean="0"/>
-              <a:t>All story points</a:t>
-            </a:r>
-            <a:br>
-              <a:rPr lang="en-US" sz="3600" dirty="0" smtClean="0"/>
-            </a:br>
-            <a:r>
-              <a:rPr lang="en-US" sz="3600" dirty="0" smtClean="0"/>
-              <a:t> were finished</a:t>
-            </a:r>
-            <a:endParaRPr lang="en-US" sz="3600" dirty="0"/>
-          </a:p>
-        </p:txBody>
-      </p:sp>
-    </p:spTree>
-    <p:extLst>
-      <p:ext uri="{BB962C8B-B14F-4D97-AF65-F5344CB8AC3E}">
-        <p14:creationId xmlns:p14="http://schemas.microsoft.com/office/powerpoint/2010/main" val="1775083496"/>
-      </p:ext>
-    </p:extLst>
-  </p:cSld>
-  <p:clrMapOvr>
-    <a:masterClrMapping/>
-  </p:clrMapOvr>
-  <p:timing>
-    <p:tnLst>
-      <p:par>
-        <p:cTn id="1" dur="indefinite" restart="never" nodeType="tmRoot"/>
-      </p:par>
-    </p:tnLst>
-  </p:timing>
 </p:sld>
 </file>
 
@@ -5128,81 +5860,16 @@
           <a:p>
             <a:r>
               <a:rPr lang="en-US" dirty="0" smtClean="0"/>
-              <a:t>Retrospectives</a:t>
+              <a:t>Use Case Diagram</a:t>
             </a:r>
             <a:endParaRPr lang="en-US" dirty="0"/>
-          </a:p>
-        </p:txBody>
-      </p:sp>
-      <p:sp>
-        <p:nvSpPr>
-          <p:cNvPr id="4" name="TextBox 3"/>
-          <p:cNvSpPr txBox="1"/>
-          <p:nvPr/>
-        </p:nvSpPr>
-        <p:spPr>
-          <a:xfrm>
-            <a:off x="2362200" y="4495800"/>
-            <a:ext cx="4876800" cy="2862322"/>
-          </a:xfrm>
-          <a:prstGeom prst="rect">
-            <a:avLst/>
-          </a:prstGeom>
-          <a:noFill/>
-        </p:spPr>
-        <p:txBody>
-          <a:bodyPr wrap="square" rtlCol="0">
-            <a:spAutoFit/>
-          </a:bodyPr>
-          <a:lstStyle/>
-          <a:p>
-            <a:r>
-              <a:rPr lang="en-US" dirty="0" smtClean="0"/>
-              <a:t>Start:</a:t>
-            </a:r>
-          </a:p>
-          <a:p>
-            <a:r>
-              <a:rPr lang="en-US" dirty="0"/>
-              <a:t>need to write in words what I am going to do before doing it</a:t>
-            </a:r>
-          </a:p>
-          <a:p>
-            <a:endParaRPr lang="en-US" dirty="0" smtClean="0"/>
-          </a:p>
-          <a:p>
-            <a:r>
-              <a:rPr lang="en-US" dirty="0" smtClean="0"/>
-              <a:t>Stop</a:t>
-            </a:r>
-          </a:p>
-          <a:p>
-            <a:r>
-              <a:rPr lang="en-US" dirty="0"/>
-              <a:t>need to spend less time into re-factoring and more time into coding other features</a:t>
-            </a:r>
-          </a:p>
-          <a:p>
-            <a:endParaRPr lang="en-US" dirty="0" smtClean="0"/>
-          </a:p>
-          <a:p>
-            <a:pPr marL="285750" indent="-285750">
-              <a:buFontTx/>
-              <a:buChar char="-"/>
-            </a:pPr>
-            <a:endParaRPr lang="en-US" dirty="0"/>
-          </a:p>
-          <a:p>
-            <a:endParaRPr lang="en-US" dirty="0" smtClean="0"/>
           </a:p>
         </p:txBody>
       </p:sp>
       <p:pic>
         <p:nvPicPr>
-          <p:cNvPr id="9220" name="Picture 4"/>
-          <p:cNvPicPr>
-            <a:picLocks noChangeAspect="1" noChangeArrowheads="1"/>
-          </p:cNvPicPr>
+          <p:cNvPr id="4" name="Picture 3"/>
+          <p:cNvPicPr/>
           <p:nvPr/>
         </p:nvPicPr>
         <p:blipFill>
@@ -5220,8 +5887,8 @@
         </p:blipFill>
         <p:spPr bwMode="auto">
           <a:xfrm>
-            <a:off x="1981200" y="1066800"/>
-            <a:ext cx="5029200" cy="3256407"/>
+            <a:off x="2286000" y="1181105"/>
+            <a:ext cx="3738880" cy="5753095"/>
           </a:xfrm>
           <a:prstGeom prst="rect">
             <a:avLst/>
@@ -5230,44 +5897,18 @@
           <a:ln>
             <a:noFill/>
           </a:ln>
-          <a:extLst>
-            <a:ext uri="{909E8E84-426E-40DD-AFC4-6F175D3DCCD1}">
-              <a14:hiddenFill xmlns:a14="http://schemas.microsoft.com/office/drawing/2010/main">
-                <a:solidFill>
-                  <a:schemeClr val="accent1"/>
-                </a:solidFill>
-              </a14:hiddenFill>
-            </a:ext>
-            <a:ext uri="{91240B29-F687-4F45-9708-019B960494DF}">
-              <a14:hiddenLine xmlns:a14="http://schemas.microsoft.com/office/drawing/2010/main" w="9525">
-                <a:solidFill>
-                  <a:schemeClr val="tx1"/>
-                </a:solidFill>
-                <a:miter lim="800000"/>
-                <a:headEnd/>
-                <a:tailEnd/>
-              </a14:hiddenLine>
-            </a:ext>
-          </a:extLst>
         </p:spPr>
       </p:pic>
     </p:spTree>
     <p:extLst>
       <p:ext uri="{BB962C8B-B14F-4D97-AF65-F5344CB8AC3E}">
-        <p14:creationId xmlns:p14="http://schemas.microsoft.com/office/powerpoint/2010/main" val="725370550"/>
+        <p14:creationId xmlns:p14="http://schemas.microsoft.com/office/powerpoint/2010/main" val="3238787736"/>
       </p:ext>
     </p:extLst>
   </p:cSld>
   <p:clrMapOvr>
     <a:masterClrMapping/>
   </p:clrMapOvr>
-  <p:timing>
-    <p:tnLst>
-      <p:par>
-        <p:cTn id="1" dur="indefinite" restart="never" nodeType="tmRoot"/>
-      </p:par>
-    </p:tnLst>
-  </p:timing>
 </p:sld>
 </file>
 

</xml_diff>